<commit_message>
add content present slide
</commit_message>
<xml_diff>
--- a/Doc/ProjectPresentation1.pptx
+++ b/Doc/ProjectPresentation1.pptx
@@ -5,17 +5,20 @@
     <p:sldMasterId id="2147483648" r:id="rId1"/>
   </p:sldMasterIdLst>
   <p:notesMasterIdLst>
-    <p:notesMasterId r:id="rId10"/>
+    <p:notesMasterId r:id="rId13"/>
   </p:notesMasterIdLst>
   <p:sldIdLst>
     <p:sldId id="256" r:id="rId2"/>
     <p:sldId id="257" r:id="rId3"/>
-    <p:sldId id="258" r:id="rId4"/>
-    <p:sldId id="260" r:id="rId5"/>
-    <p:sldId id="262" r:id="rId6"/>
-    <p:sldId id="261" r:id="rId7"/>
-    <p:sldId id="263" r:id="rId8"/>
-    <p:sldId id="264" r:id="rId9"/>
+    <p:sldId id="265" r:id="rId4"/>
+    <p:sldId id="266" r:id="rId5"/>
+    <p:sldId id="267" r:id="rId6"/>
+    <p:sldId id="258" r:id="rId7"/>
+    <p:sldId id="260" r:id="rId8"/>
+    <p:sldId id="262" r:id="rId9"/>
+    <p:sldId id="261" r:id="rId10"/>
+    <p:sldId id="263" r:id="rId11"/>
+    <p:sldId id="264" r:id="rId12"/>
   </p:sldIdLst>
   <p:sldSz cx="9144000" cy="6858000" type="screen4x3"/>
   <p:notesSz cx="6858000" cy="9144000"/>
@@ -1043,7 +1046,7 @@
       </dgm:t>
     </dgm:pt>
     <dgm:pt modelId="{9CF2904A-95E3-426D-A0E7-D36C77D650C8}" type="pres">
-      <dgm:prSet presAssocID="{7622D27D-1418-454B-8843-814A956FD9D1}" presName="ellipse" presStyleLbl="trBgShp" presStyleIdx="0" presStyleCnt="1" custScaleX="108721" custScaleY="124000" custLinFactNeighborY="-10265"/>
+      <dgm:prSet presAssocID="{7622D27D-1418-454B-8843-814A956FD9D1}" presName="ellipse" presStyleLbl="trBgShp" presStyleIdx="0" presStyleCnt="1" custScaleX="108721" custScaleY="124000" custLinFactNeighborX="1595" custLinFactNeighborY="-10265"/>
       <dgm:spPr/>
     </dgm:pt>
     <dgm:pt modelId="{EA5B7450-7D1F-4252-A574-1CAA4E07FC8D}" type="pres">
@@ -1116,15 +1119,15 @@
     </dgm:pt>
   </dgm:ptLst>
   <dgm:cxnLst>
-    <dgm:cxn modelId="{1EC9FBEF-BD93-48BC-BB0C-E3D2D3DE23F2}" srcId="{7622D27D-1418-454B-8843-814A956FD9D1}" destId="{95DC65B9-BC1A-4760-A531-1FC856889EB4}" srcOrd="3" destOrd="0" parTransId="{A8B784AB-1A2C-4088-A443-824CDCB3F757}" sibTransId="{67741F9B-B633-44EF-99A4-44D843F45A36}"/>
+    <dgm:cxn modelId="{BCAE8D34-2DF0-4DF2-80F1-3CA31A184F70}" type="presOf" srcId="{B16CC3DF-6F09-447E-9CAB-0F26C694BF33}" destId="{C67984F5-77EA-43A6-9D02-299A9C887AB4}" srcOrd="0" destOrd="0" presId="urn:microsoft.com/office/officeart/2005/8/layout/funnel1"/>
+    <dgm:cxn modelId="{0BFA8BCD-64BD-4EFF-B899-C8719F8A0E55}" srcId="{7622D27D-1418-454B-8843-814A956FD9D1}" destId="{DC903487-BB82-4DFC-B625-BF85C817133E}" srcOrd="2" destOrd="0" parTransId="{FBB9706C-C441-4FAF-B21F-13CB8C42005C}" sibTransId="{3A0450F4-50FE-4FA7-B739-C1195D3FA9A7}"/>
+    <dgm:cxn modelId="{0147FC70-517A-49A2-A64B-D42D84E7CA6E}" type="presOf" srcId="{76944704-A16E-40A3-8D28-45750423D4AB}" destId="{7A545E6C-0F8C-4132-B331-B7ECFC12E3A6}" srcOrd="0" destOrd="0" presId="urn:microsoft.com/office/officeart/2005/8/layout/funnel1"/>
     <dgm:cxn modelId="{6265AE14-D555-4E97-B629-B39B867113A5}" type="presOf" srcId="{DC903487-BB82-4DFC-B625-BF85C817133E}" destId="{2D2081E2-93B7-4D82-B3DD-84A7043B4E30}" srcOrd="0" destOrd="0" presId="urn:microsoft.com/office/officeart/2005/8/layout/funnel1"/>
-    <dgm:cxn modelId="{BCAE8D34-2DF0-4DF2-80F1-3CA31A184F70}" type="presOf" srcId="{B16CC3DF-6F09-447E-9CAB-0F26C694BF33}" destId="{C67984F5-77EA-43A6-9D02-299A9C887AB4}" srcOrd="0" destOrd="0" presId="urn:microsoft.com/office/officeart/2005/8/layout/funnel1"/>
     <dgm:cxn modelId="{26A19BB3-2B5D-4A8B-9F43-CD9DC2115091}" type="presOf" srcId="{7622D27D-1418-454B-8843-814A956FD9D1}" destId="{7BD4EBA1-C18C-43A4-B814-C8137E3BBEB1}" srcOrd="0" destOrd="0" presId="urn:microsoft.com/office/officeart/2005/8/layout/funnel1"/>
     <dgm:cxn modelId="{C87A493C-5A32-4F48-B471-F15B3B632119}" srcId="{7622D27D-1418-454B-8843-814A956FD9D1}" destId="{B16CC3DF-6F09-447E-9CAB-0F26C694BF33}" srcOrd="0" destOrd="0" parTransId="{A2B03C21-AD22-4A41-B91A-EDBBF4A9E303}" sibTransId="{5B0884FF-B6FC-4D9E-826D-A274B44DC1C5}"/>
+    <dgm:cxn modelId="{C32F4944-87AD-440A-8446-BA7FDD34A189}" type="presOf" srcId="{95DC65B9-BC1A-4760-A531-1FC856889EB4}" destId="{AED0CA65-6A91-4F55-B1D5-2C93C67A216C}" srcOrd="0" destOrd="0" presId="urn:microsoft.com/office/officeart/2005/8/layout/funnel1"/>
+    <dgm:cxn modelId="{1EC9FBEF-BD93-48BC-BB0C-E3D2D3DE23F2}" srcId="{7622D27D-1418-454B-8843-814A956FD9D1}" destId="{95DC65B9-BC1A-4760-A531-1FC856889EB4}" srcOrd="3" destOrd="0" parTransId="{A8B784AB-1A2C-4088-A443-824CDCB3F757}" sibTransId="{67741F9B-B633-44EF-99A4-44D843F45A36}"/>
     <dgm:cxn modelId="{2114F41E-B164-4555-8679-582A2790C4D7}" srcId="{7622D27D-1418-454B-8843-814A956FD9D1}" destId="{76944704-A16E-40A3-8D28-45750423D4AB}" srcOrd="1" destOrd="0" parTransId="{4C9ED8B0-9A97-497C-B9E1-739F3EF399DD}" sibTransId="{EDA11C35-0ABC-482C-B1A8-EDECC8460B99}"/>
-    <dgm:cxn modelId="{0147FC70-517A-49A2-A64B-D42D84E7CA6E}" type="presOf" srcId="{76944704-A16E-40A3-8D28-45750423D4AB}" destId="{7A545E6C-0F8C-4132-B331-B7ECFC12E3A6}" srcOrd="0" destOrd="0" presId="urn:microsoft.com/office/officeart/2005/8/layout/funnel1"/>
-    <dgm:cxn modelId="{C32F4944-87AD-440A-8446-BA7FDD34A189}" type="presOf" srcId="{95DC65B9-BC1A-4760-A531-1FC856889EB4}" destId="{AED0CA65-6A91-4F55-B1D5-2C93C67A216C}" srcOrd="0" destOrd="0" presId="urn:microsoft.com/office/officeart/2005/8/layout/funnel1"/>
-    <dgm:cxn modelId="{0BFA8BCD-64BD-4EFF-B899-C8719F8A0E55}" srcId="{7622D27D-1418-454B-8843-814A956FD9D1}" destId="{DC903487-BB82-4DFC-B625-BF85C817133E}" srcOrd="2" destOrd="0" parTransId="{FBB9706C-C441-4FAF-B21F-13CB8C42005C}" sibTransId="{3A0450F4-50FE-4FA7-B739-C1195D3FA9A7}"/>
     <dgm:cxn modelId="{4C8EBBD5-3527-4D0E-A55C-9D5FC5B226C0}" type="presParOf" srcId="{7BD4EBA1-C18C-43A4-B814-C8137E3BBEB1}" destId="{9CF2904A-95E3-426D-A0E7-D36C77D650C8}" srcOrd="0" destOrd="0" presId="urn:microsoft.com/office/officeart/2005/8/layout/funnel1"/>
     <dgm:cxn modelId="{F73DA345-643B-4594-82F9-9CD6AB01601B}" type="presParOf" srcId="{7BD4EBA1-C18C-43A4-B814-C8137E3BBEB1}" destId="{EA5B7450-7D1F-4252-A574-1CAA4E07FC8D}" srcOrd="1" destOrd="0" presId="urn:microsoft.com/office/officeart/2005/8/layout/funnel1"/>
     <dgm:cxn modelId="{9D6A8A07-0890-4B25-BE1D-C677BDE37E75}" type="presParOf" srcId="{7BD4EBA1-C18C-43A4-B814-C8137E3BBEB1}" destId="{AED0CA65-6A91-4F55-B1D5-2C93C67A216C}" srcOrd="2" destOrd="0" presId="urn:microsoft.com/office/officeart/2005/8/layout/funnel1"/>
@@ -1137,14 +1140,14 @@
   <dgm:whole/>
   <dgm:extLst>
     <a:ext uri="http://schemas.microsoft.com/office/drawing/2008/diagram">
-      <dsp:dataModelExt xmlns:dsp="http://schemas.microsoft.com/office/drawing/2008/diagram" xmlns="" relId="rId6" minVer="http://schemas.openxmlformats.org/drawingml/2006/diagram"/>
+      <dsp:dataModelExt xmlns:dsp="http://schemas.microsoft.com/office/drawing/2008/diagram" relId="rId6" minVer="http://schemas.openxmlformats.org/drawingml/2006/diagram"/>
     </a:ext>
   </dgm:extLst>
 </dgm:dataModel>
 </file>
 
 <file path=ppt/diagrams/drawing1.xml><?xml version="1.0" encoding="utf-8"?>
-<dsp:drawing xmlns:dgm="http://schemas.openxmlformats.org/drawingml/2006/diagram" xmlns:a="http://schemas.openxmlformats.org/drawingml/2006/main" xmlns:dsp="http://schemas.microsoft.com/office/drawing/2008/diagram">
+<dsp:drawing xmlns:dgm="http://schemas.openxmlformats.org/drawingml/2006/diagram" xmlns:dsp="http://schemas.microsoft.com/office/drawing/2008/diagram" xmlns:a="http://schemas.openxmlformats.org/drawingml/2006/main">
   <dsp:spTree>
     <dsp:nvGrpSpPr>
       <dsp:cNvPr id="0" name=""/>
@@ -1158,7 +1161,7 @@
       </dsp:nvSpPr>
       <dsp:spPr>
         <a:xfrm>
-          <a:off x="751859" y="152398"/>
+          <a:off x="803990" y="152398"/>
           <a:ext cx="3553446" cy="1407493"/>
         </a:xfrm>
         <a:prstGeom prst="ellipse">
@@ -1373,8 +1376,8 @@
         </a:p>
       </dsp:txBody>
       <dsp:txXfrm>
-        <a:off x="2082660" y="1627862"/>
-        <a:ext cx="1140142" cy="1140142"/>
+        <a:off x="2249630" y="1794832"/>
+        <a:ext cx="806202" cy="806202"/>
       </dsp:txXfrm>
     </dsp:sp>
     <dsp:sp modelId="{7A545E6C-0F8C-4132-B331-B7ECFC12E3A6}">
@@ -1450,8 +1453,8 @@
         </a:p>
       </dsp:txBody>
       <dsp:txXfrm>
-        <a:off x="1031100" y="152401"/>
-        <a:ext cx="1902601" cy="1833942"/>
+        <a:off x="1309729" y="420976"/>
+        <a:ext cx="1345343" cy="1296792"/>
       </dsp:txXfrm>
     </dsp:sp>
     <dsp:sp modelId="{C67984F5-77EA-43A6-9D02-299A9C887AB4}">
@@ -1527,8 +1530,8 @@
         </a:p>
       </dsp:txBody>
       <dsp:txXfrm>
-        <a:off x="2690044" y="304801"/>
-        <a:ext cx="1539055" cy="1524222"/>
+        <a:off x="2915433" y="528018"/>
+        <a:ext cx="1088277" cy="1077788"/>
       </dsp:txXfrm>
     </dsp:sp>
     <dsp:sp modelId="{C135540B-42C5-49CB-93AC-CD61871322B3}">
@@ -3018,7 +3021,7 @@
             <a:fld id="{8529C4BC-B2A5-4433-83F8-57753B4C3B20}" type="datetimeFigureOut">
               <a:rPr lang="en-US" smtClean="0"/>
               <a:pPr/>
-              <a:t>8/23/2011</a:t>
+              <a:t>8/27/2011</a:t>
             </a:fld>
             <a:endParaRPr lang="en-US"/>
           </a:p>
@@ -3187,7 +3190,7 @@
     </p:spTree>
     <p:extLst>
       <p:ext uri="{BB962C8B-B14F-4D97-AF65-F5344CB8AC3E}">
-        <p14:creationId xmlns:p14="http://schemas.microsoft.com/office/powerpoint/2010/main" xmlns="" val="1972029052"/>
+        <p14:creationId xmlns:p14="http://schemas.microsoft.com/office/powerpoint/2010/main" val="1972029052"/>
       </p:ext>
     </p:extLst>
   </p:cSld>
@@ -3353,7 +3356,7 @@
             <a:fld id="{DADD876A-1B49-49DD-8F2D-83CBD6209C57}" type="slidenum">
               <a:rPr lang="en-US" smtClean="0"/>
               <a:pPr/>
-              <a:t>4</a:t>
+              <a:t>7</a:t>
             </a:fld>
             <a:endParaRPr lang="en-US"/>
           </a:p>
@@ -3362,7 +3365,7 @@
     </p:spTree>
     <p:extLst>
       <p:ext uri="{BB962C8B-B14F-4D97-AF65-F5344CB8AC3E}">
-        <p14:creationId xmlns:p14="http://schemas.microsoft.com/office/powerpoint/2010/main" xmlns="" val="3222338183"/>
+        <p14:creationId xmlns:p14="http://schemas.microsoft.com/office/powerpoint/2010/main" val="3222338183"/>
       </p:ext>
     </p:extLst>
   </p:cSld>
@@ -3438,7 +3441,7 @@
             <a:fld id="{DADD876A-1B49-49DD-8F2D-83CBD6209C57}" type="slidenum">
               <a:rPr lang="en-US" smtClean="0"/>
               <a:pPr/>
-              <a:t>5</a:t>
+              <a:t>8</a:t>
             </a:fld>
             <a:endParaRPr lang="en-US"/>
           </a:p>
@@ -3447,7 +3450,7 @@
     </p:spTree>
     <p:extLst>
       <p:ext uri="{BB962C8B-B14F-4D97-AF65-F5344CB8AC3E}">
-        <p14:creationId xmlns:p14="http://schemas.microsoft.com/office/powerpoint/2010/main" xmlns="" val="3222338183"/>
+        <p14:creationId xmlns:p14="http://schemas.microsoft.com/office/powerpoint/2010/main" val="3222338183"/>
       </p:ext>
     </p:extLst>
   </p:cSld>
@@ -3639,7 +3642,7 @@
             <a:fld id="{A623BE0C-B4FE-411C-B00F-FCA6A312E010}" type="datetimeFigureOut">
               <a:rPr lang="en-US" smtClean="0"/>
               <a:pPr/>
-              <a:t>8/23/2011</a:t>
+              <a:t>8/27/2011</a:t>
             </a:fld>
             <a:endParaRPr lang="en-US"/>
           </a:p>
@@ -3691,7 +3694,7 @@
     </p:spTree>
     <p:extLst>
       <p:ext uri="{BB962C8B-B14F-4D97-AF65-F5344CB8AC3E}">
-        <p14:creationId xmlns:p14="http://schemas.microsoft.com/office/powerpoint/2010/main" xmlns="" val="323588753"/>
+        <p14:creationId xmlns:p14="http://schemas.microsoft.com/office/powerpoint/2010/main" val="323588753"/>
       </p:ext>
     </p:extLst>
   </p:cSld>
@@ -3811,7 +3814,7 @@
             <a:fld id="{A623BE0C-B4FE-411C-B00F-FCA6A312E010}" type="datetimeFigureOut">
               <a:rPr lang="en-US" smtClean="0"/>
               <a:pPr/>
-              <a:t>8/23/2011</a:t>
+              <a:t>8/27/2011</a:t>
             </a:fld>
             <a:endParaRPr lang="en-US"/>
           </a:p>
@@ -3863,7 +3866,7 @@
     </p:spTree>
     <p:extLst>
       <p:ext uri="{BB962C8B-B14F-4D97-AF65-F5344CB8AC3E}">
-        <p14:creationId xmlns:p14="http://schemas.microsoft.com/office/powerpoint/2010/main" xmlns="" val="2921916018"/>
+        <p14:creationId xmlns:p14="http://schemas.microsoft.com/office/powerpoint/2010/main" val="2921916018"/>
       </p:ext>
     </p:extLst>
   </p:cSld>
@@ -3993,7 +3996,7 @@
             <a:fld id="{A623BE0C-B4FE-411C-B00F-FCA6A312E010}" type="datetimeFigureOut">
               <a:rPr lang="en-US" smtClean="0"/>
               <a:pPr/>
-              <a:t>8/23/2011</a:t>
+              <a:t>8/27/2011</a:t>
             </a:fld>
             <a:endParaRPr lang="en-US"/>
           </a:p>
@@ -4045,7 +4048,7 @@
     </p:spTree>
     <p:extLst>
       <p:ext uri="{BB962C8B-B14F-4D97-AF65-F5344CB8AC3E}">
-        <p14:creationId xmlns:p14="http://schemas.microsoft.com/office/powerpoint/2010/main" xmlns="" val="3760154480"/>
+        <p14:creationId xmlns:p14="http://schemas.microsoft.com/office/powerpoint/2010/main" val="3760154480"/>
       </p:ext>
     </p:extLst>
   </p:cSld>
@@ -4165,7 +4168,7 @@
             <a:fld id="{A623BE0C-B4FE-411C-B00F-FCA6A312E010}" type="datetimeFigureOut">
               <a:rPr lang="en-US" smtClean="0"/>
               <a:pPr/>
-              <a:t>8/23/2011</a:t>
+              <a:t>8/27/2011</a:t>
             </a:fld>
             <a:endParaRPr lang="en-US"/>
           </a:p>
@@ -4217,7 +4220,7 @@
     </p:spTree>
     <p:extLst>
       <p:ext uri="{BB962C8B-B14F-4D97-AF65-F5344CB8AC3E}">
-        <p14:creationId xmlns:p14="http://schemas.microsoft.com/office/powerpoint/2010/main" xmlns="" val="2253544174"/>
+        <p14:creationId xmlns:p14="http://schemas.microsoft.com/office/powerpoint/2010/main" val="2253544174"/>
       </p:ext>
     </p:extLst>
   </p:cSld>
@@ -4413,7 +4416,7 @@
             <a:fld id="{A623BE0C-B4FE-411C-B00F-FCA6A312E010}" type="datetimeFigureOut">
               <a:rPr lang="en-US" smtClean="0"/>
               <a:pPr/>
-              <a:t>8/23/2011</a:t>
+              <a:t>8/27/2011</a:t>
             </a:fld>
             <a:endParaRPr lang="en-US"/>
           </a:p>
@@ -4465,7 +4468,7 @@
     </p:spTree>
     <p:extLst>
       <p:ext uri="{BB962C8B-B14F-4D97-AF65-F5344CB8AC3E}">
-        <p14:creationId xmlns:p14="http://schemas.microsoft.com/office/powerpoint/2010/main" xmlns="" val="2280461358"/>
+        <p14:creationId xmlns:p14="http://schemas.microsoft.com/office/powerpoint/2010/main" val="2280461358"/>
       </p:ext>
     </p:extLst>
   </p:cSld>
@@ -4703,7 +4706,7 @@
             <a:fld id="{A623BE0C-B4FE-411C-B00F-FCA6A312E010}" type="datetimeFigureOut">
               <a:rPr lang="en-US" smtClean="0"/>
               <a:pPr/>
-              <a:t>8/23/2011</a:t>
+              <a:t>8/27/2011</a:t>
             </a:fld>
             <a:endParaRPr lang="en-US"/>
           </a:p>
@@ -4755,7 +4758,7 @@
     </p:spTree>
     <p:extLst>
       <p:ext uri="{BB962C8B-B14F-4D97-AF65-F5344CB8AC3E}">
-        <p14:creationId xmlns:p14="http://schemas.microsoft.com/office/powerpoint/2010/main" xmlns="" val="2314838259"/>
+        <p14:creationId xmlns:p14="http://schemas.microsoft.com/office/powerpoint/2010/main" val="2314838259"/>
       </p:ext>
     </p:extLst>
   </p:cSld>
@@ -5127,7 +5130,7 @@
             <a:fld id="{A623BE0C-B4FE-411C-B00F-FCA6A312E010}" type="datetimeFigureOut">
               <a:rPr lang="en-US" smtClean="0"/>
               <a:pPr/>
-              <a:t>8/23/2011</a:t>
+              <a:t>8/27/2011</a:t>
             </a:fld>
             <a:endParaRPr lang="en-US"/>
           </a:p>
@@ -5179,7 +5182,7 @@
     </p:spTree>
     <p:extLst>
       <p:ext uri="{BB962C8B-B14F-4D97-AF65-F5344CB8AC3E}">
-        <p14:creationId xmlns:p14="http://schemas.microsoft.com/office/powerpoint/2010/main" xmlns="" val="825642813"/>
+        <p14:creationId xmlns:p14="http://schemas.microsoft.com/office/powerpoint/2010/main" val="825642813"/>
       </p:ext>
     </p:extLst>
   </p:cSld>
@@ -5247,7 +5250,7 @@
             <a:fld id="{A623BE0C-B4FE-411C-B00F-FCA6A312E010}" type="datetimeFigureOut">
               <a:rPr lang="en-US" smtClean="0"/>
               <a:pPr/>
-              <a:t>8/23/2011</a:t>
+              <a:t>8/27/2011</a:t>
             </a:fld>
             <a:endParaRPr lang="en-US"/>
           </a:p>
@@ -5299,7 +5302,7 @@
     </p:spTree>
     <p:extLst>
       <p:ext uri="{BB962C8B-B14F-4D97-AF65-F5344CB8AC3E}">
-        <p14:creationId xmlns:p14="http://schemas.microsoft.com/office/powerpoint/2010/main" xmlns="" val="2594057694"/>
+        <p14:creationId xmlns:p14="http://schemas.microsoft.com/office/powerpoint/2010/main" val="2594057694"/>
       </p:ext>
     </p:extLst>
   </p:cSld>
@@ -5344,7 +5347,7 @@
             <a:fld id="{A623BE0C-B4FE-411C-B00F-FCA6A312E010}" type="datetimeFigureOut">
               <a:rPr lang="en-US" smtClean="0"/>
               <a:pPr/>
-              <a:t>8/23/2011</a:t>
+              <a:t>8/27/2011</a:t>
             </a:fld>
             <a:endParaRPr lang="en-US"/>
           </a:p>
@@ -5396,7 +5399,7 @@
     </p:spTree>
     <p:extLst>
       <p:ext uri="{BB962C8B-B14F-4D97-AF65-F5344CB8AC3E}">
-        <p14:creationId xmlns:p14="http://schemas.microsoft.com/office/powerpoint/2010/main" xmlns="" val="3349367938"/>
+        <p14:creationId xmlns:p14="http://schemas.microsoft.com/office/powerpoint/2010/main" val="3349367938"/>
       </p:ext>
     </p:extLst>
   </p:cSld>
@@ -5623,7 +5626,7 @@
             <a:fld id="{A623BE0C-B4FE-411C-B00F-FCA6A312E010}" type="datetimeFigureOut">
               <a:rPr lang="en-US" smtClean="0"/>
               <a:pPr/>
-              <a:t>8/23/2011</a:t>
+              <a:t>8/27/2011</a:t>
             </a:fld>
             <a:endParaRPr lang="en-US"/>
           </a:p>
@@ -5675,7 +5678,7 @@
     </p:spTree>
     <p:extLst>
       <p:ext uri="{BB962C8B-B14F-4D97-AF65-F5344CB8AC3E}">
-        <p14:creationId xmlns:p14="http://schemas.microsoft.com/office/powerpoint/2010/main" xmlns="" val="2003841279"/>
+        <p14:creationId xmlns:p14="http://schemas.microsoft.com/office/powerpoint/2010/main" val="2003841279"/>
       </p:ext>
     </p:extLst>
   </p:cSld>
@@ -5878,7 +5881,7 @@
             <a:fld id="{A623BE0C-B4FE-411C-B00F-FCA6A312E010}" type="datetimeFigureOut">
               <a:rPr lang="en-US" smtClean="0"/>
               <a:pPr/>
-              <a:t>8/23/2011</a:t>
+              <a:t>8/27/2011</a:t>
             </a:fld>
             <a:endParaRPr lang="en-US"/>
           </a:p>
@@ -5930,7 +5933,7 @@
     </p:spTree>
     <p:extLst>
       <p:ext uri="{BB962C8B-B14F-4D97-AF65-F5344CB8AC3E}">
-        <p14:creationId xmlns:p14="http://schemas.microsoft.com/office/powerpoint/2010/main" xmlns="" val="2630436295"/>
+        <p14:creationId xmlns:p14="http://schemas.microsoft.com/office/powerpoint/2010/main" val="2630436295"/>
       </p:ext>
     </p:extLst>
   </p:cSld>
@@ -6114,7 +6117,7 @@
             <a:fld id="{A623BE0C-B4FE-411C-B00F-FCA6A312E010}" type="datetimeFigureOut">
               <a:rPr lang="en-US" smtClean="0"/>
               <a:pPr/>
-              <a:t>8/23/2011</a:t>
+              <a:t>8/27/2011</a:t>
             </a:fld>
             <a:endParaRPr lang="en-US"/>
           </a:p>
@@ -6202,7 +6205,7 @@
     </p:spTree>
     <p:extLst>
       <p:ext uri="{BB962C8B-B14F-4D97-AF65-F5344CB8AC3E}">
-        <p14:creationId xmlns:p14="http://schemas.microsoft.com/office/powerpoint/2010/main" xmlns="" val="775339368"/>
+        <p14:creationId xmlns:p14="http://schemas.microsoft.com/office/powerpoint/2010/main" val="775339368"/>
       </p:ext>
     </p:extLst>
   </p:cSld>
@@ -6610,7 +6613,7 @@
     </p:spTree>
     <p:extLst>
       <p:ext uri="{BB962C8B-B14F-4D97-AF65-F5344CB8AC3E}">
-        <p14:creationId xmlns:p14="http://schemas.microsoft.com/office/powerpoint/2010/main" xmlns="" val="3765382340"/>
+        <p14:creationId xmlns:p14="http://schemas.microsoft.com/office/powerpoint/2010/main" val="3765382340"/>
       </p:ext>
     </p:extLst>
   </p:cSld>
@@ -6627,1070 +6630,7 @@
 </p:sld>
 </file>
 
-<file path=ppt/slides/slide2.xml><?xml version="1.0" encoding="utf-8"?>
-<p:sld xmlns:a="http://schemas.openxmlformats.org/drawingml/2006/main" xmlns:r="http://schemas.openxmlformats.org/officeDocument/2006/relationships" xmlns:p="http://schemas.openxmlformats.org/presentationml/2006/main">
-  <p:cSld>
-    <p:spTree>
-      <p:nvGrpSpPr>
-        <p:cNvPr id="1" name=""/>
-        <p:cNvGrpSpPr/>
-        <p:nvPr/>
-      </p:nvGrpSpPr>
-      <p:grpSpPr>
-        <a:xfrm>
-          <a:off x="0" y="0"/>
-          <a:ext cx="0" cy="0"/>
-          <a:chOff x="0" y="0"/>
-          <a:chExt cx="0" cy="0"/>
-        </a:xfrm>
-      </p:grpSpPr>
-      <p:sp>
-        <p:nvSpPr>
-          <p:cNvPr id="4" name="Title 3"/>
-          <p:cNvSpPr>
-            <a:spLocks noGrp="1"/>
-          </p:cNvSpPr>
-          <p:nvPr>
-            <p:ph type="title"/>
-          </p:nvPr>
-        </p:nvSpPr>
-        <p:spPr/>
-        <p:txBody>
-          <a:bodyPr/>
-          <a:lstStyle/>
-          <a:p>
-            <a:r>
-              <a:rPr lang="th-TH" dirty="0" smtClean="0"/>
-              <a:t>ทำไมจึงทำโครงงานนี้</a:t>
-            </a:r>
-            <a:endParaRPr lang="en-US" dirty="0"/>
-          </a:p>
-        </p:txBody>
-      </p:sp>
-      <p:sp>
-        <p:nvSpPr>
-          <p:cNvPr id="5" name="Content Placeholder 4"/>
-          <p:cNvSpPr>
-            <a:spLocks noGrp="1"/>
-          </p:cNvSpPr>
-          <p:nvPr>
-            <p:ph idx="1"/>
-          </p:nvPr>
-        </p:nvSpPr>
-        <p:spPr/>
-        <p:txBody>
-          <a:bodyPr/>
-          <a:lstStyle/>
-          <a:p>
-            <a:r>
-              <a:rPr lang="en-US" smtClean="0"/>
-              <a:t>Hello world</a:t>
-            </a:r>
-            <a:endParaRPr lang="en-US" dirty="0"/>
-          </a:p>
-        </p:txBody>
-      </p:sp>
-    </p:spTree>
-    <p:extLst>
-      <p:ext uri="{BB962C8B-B14F-4D97-AF65-F5344CB8AC3E}">
-        <p14:creationId xmlns:p14="http://schemas.microsoft.com/office/powerpoint/2010/main" xmlns="" val="96058202"/>
-      </p:ext>
-    </p:extLst>
-  </p:cSld>
-  <p:clrMapOvr>
-    <a:masterClrMapping/>
-  </p:clrMapOvr>
-  <p:timing>
-    <p:tnLst>
-      <p:par>
-        <p:cTn id="1" dur="indefinite" restart="never" nodeType="tmRoot"/>
-      </p:par>
-    </p:tnLst>
-  </p:timing>
-</p:sld>
-</file>
-
-<file path=ppt/slides/slide3.xml><?xml version="1.0" encoding="utf-8"?>
-<p:sld xmlns:a="http://schemas.openxmlformats.org/drawingml/2006/main" xmlns:r="http://schemas.openxmlformats.org/officeDocument/2006/relationships" xmlns:p="http://schemas.openxmlformats.org/presentationml/2006/main">
-  <p:cSld>
-    <p:spTree>
-      <p:nvGrpSpPr>
-        <p:cNvPr id="1" name=""/>
-        <p:cNvGrpSpPr/>
-        <p:nvPr/>
-      </p:nvGrpSpPr>
-      <p:grpSpPr>
-        <a:xfrm>
-          <a:off x="0" y="0"/>
-          <a:ext cx="0" cy="0"/>
-          <a:chOff x="0" y="0"/>
-          <a:chExt cx="0" cy="0"/>
-        </a:xfrm>
-      </p:grpSpPr>
-      <p:sp>
-        <p:nvSpPr>
-          <p:cNvPr id="2" name="Title 1"/>
-          <p:cNvSpPr>
-            <a:spLocks noGrp="1"/>
-          </p:cNvSpPr>
-          <p:nvPr>
-            <p:ph type="title"/>
-          </p:nvPr>
-        </p:nvSpPr>
-        <p:spPr/>
-        <p:txBody>
-          <a:bodyPr>
-            <a:normAutofit/>
-          </a:bodyPr>
-          <a:lstStyle/>
-          <a:p>
-            <a:r>
-              <a:rPr lang="th-TH" sz="6000" b="1" dirty="0" smtClean="0"/>
-              <a:t>หลักการทำงานของโปรแกรม</a:t>
-            </a:r>
-            <a:endParaRPr lang="en-US" sz="6000" b="1" dirty="0"/>
-          </a:p>
-        </p:txBody>
-      </p:sp>
-      <p:graphicFrame>
-        <p:nvGraphicFramePr>
-          <p:cNvPr id="4" name="Content Placeholder 3"/>
-          <p:cNvGraphicFramePr>
-            <a:graphicFrameLocks noGrp="1"/>
-          </p:cNvGraphicFramePr>
-          <p:nvPr>
-            <p:ph idx="1"/>
-            <p:extLst>
-              <p:ext uri="{D42A27DB-BD31-4B8C-83A1-F6EECF244321}">
-                <p14:modId xmlns:p14="http://schemas.microsoft.com/office/powerpoint/2010/main" xmlns="" val="2714443008"/>
-              </p:ext>
-            </p:extLst>
-          </p:nvPr>
-        </p:nvGraphicFramePr>
-        <p:xfrm>
-          <a:off x="3771900" y="1295400"/>
-          <a:ext cx="5067300" cy="4343400"/>
-        </p:xfrm>
-        <a:graphic>
-          <a:graphicData uri="http://schemas.openxmlformats.org/drawingml/2006/diagram">
-            <dgm:relIds xmlns:dgm="http://schemas.openxmlformats.org/drawingml/2006/diagram" xmlns:r="http://schemas.openxmlformats.org/officeDocument/2006/relationships" r:dm="rId2" r:lo="rId3" r:qs="rId4" r:cs="rId5"/>
-          </a:graphicData>
-        </a:graphic>
-      </p:graphicFrame>
-      <p:pic>
-        <p:nvPicPr>
-          <p:cNvPr id="5" name="Picture 4"/>
-          <p:cNvPicPr>
-            <a:picLocks noChangeAspect="1"/>
-          </p:cNvPicPr>
-          <p:nvPr/>
-        </p:nvPicPr>
-        <p:blipFill>
-          <a:blip r:embed="rId7" cstate="print">
-            <a:extLst>
-              <a:ext uri="{28A0092B-C50C-407E-A947-70E740481C1C}">
-                <a14:useLocalDpi xmlns:a14="http://schemas.microsoft.com/office/drawing/2010/main" xmlns="" val="0"/>
-              </a:ext>
-            </a:extLst>
-          </a:blip>
-          <a:stretch>
-            <a:fillRect/>
-          </a:stretch>
-        </p:blipFill>
-        <p:spPr>
-          <a:xfrm>
-            <a:off x="5638800" y="5410200"/>
-            <a:ext cx="1219200" cy="1219200"/>
-          </a:xfrm>
-          <a:prstGeom prst="rect">
-            <a:avLst/>
-          </a:prstGeom>
-        </p:spPr>
-      </p:pic>
-      <p:pic>
-        <p:nvPicPr>
-          <p:cNvPr id="1028" name="Picture 4" descr="C:\Users\JOeCole\AppData\Local\Microsoft\Windows\Temporary Internet Files\Content.IE5\99KOCIIL\MC900433922[1].png"/>
-          <p:cNvPicPr>
-            <a:picLocks noChangeAspect="1" noChangeArrowheads="1"/>
-          </p:cNvPicPr>
-          <p:nvPr/>
-        </p:nvPicPr>
-        <p:blipFill>
-          <a:blip r:embed="rId8" cstate="print">
-            <a:extLst>
-              <a:ext uri="{28A0092B-C50C-407E-A947-70E740481C1C}">
-                <a14:useLocalDpi xmlns:a14="http://schemas.microsoft.com/office/drawing/2010/main" xmlns="" val="0"/>
-              </a:ext>
-            </a:extLst>
-          </a:blip>
-          <a:srcRect/>
-          <a:stretch>
-            <a:fillRect/>
-          </a:stretch>
-        </p:blipFill>
-        <p:spPr bwMode="auto">
-          <a:xfrm flipH="1">
-            <a:off x="685800" y="1600200"/>
-            <a:ext cx="2057400" cy="2057400"/>
-          </a:xfrm>
-          <a:prstGeom prst="rect">
-            <a:avLst/>
-          </a:prstGeom>
-          <a:noFill/>
-          <a:extLst>
-            <a:ext uri="{909E8E84-426E-40DD-AFC4-6F175D3DCCD1}">
-              <a14:hiddenFill xmlns:a14="http://schemas.microsoft.com/office/drawing/2010/main" xmlns="">
-                <a:solidFill>
-                  <a:srgbClr val="FFFFFF"/>
-                </a:solidFill>
-              </a14:hiddenFill>
-            </a:ext>
-          </a:extLst>
-        </p:spPr>
-      </p:pic>
-      <p:cxnSp>
-        <p:nvCxnSpPr>
-          <p:cNvPr id="9" name="Straight Arrow Connector 8"/>
-          <p:cNvCxnSpPr/>
-          <p:nvPr/>
-        </p:nvCxnSpPr>
-        <p:spPr>
-          <a:xfrm>
-            <a:off x="2743200" y="2857500"/>
-            <a:ext cx="1981200" cy="495300"/>
-          </a:xfrm>
-          <a:prstGeom prst="straightConnector1">
-            <a:avLst/>
-          </a:prstGeom>
-          <a:ln>
-            <a:tailEnd type="arrow"/>
-          </a:ln>
-        </p:spPr>
-        <p:style>
-          <a:lnRef idx="3">
-            <a:schemeClr val="dk1"/>
-          </a:lnRef>
-          <a:fillRef idx="0">
-            <a:schemeClr val="dk1"/>
-          </a:fillRef>
-          <a:effectRef idx="2">
-            <a:schemeClr val="dk1"/>
-          </a:effectRef>
-          <a:fontRef idx="minor">
-            <a:schemeClr val="tx1"/>
-          </a:fontRef>
-        </p:style>
-      </p:cxnSp>
-    </p:spTree>
-    <p:extLst>
-      <p:ext uri="{BB962C8B-B14F-4D97-AF65-F5344CB8AC3E}">
-        <p14:creationId xmlns:p14="http://schemas.microsoft.com/office/powerpoint/2010/main" xmlns="" val="1015130875"/>
-      </p:ext>
-    </p:extLst>
-  </p:cSld>
-  <p:clrMapOvr>
-    <a:masterClrMapping/>
-  </p:clrMapOvr>
-  <p:timing>
-    <p:tnLst>
-      <p:par>
-        <p:cTn id="1" dur="indefinite" restart="never" nodeType="tmRoot"/>
-      </p:par>
-    </p:tnLst>
-  </p:timing>
-</p:sld>
-</file>
-
-<file path=ppt/slides/slide4.xml><?xml version="1.0" encoding="utf-8"?>
-<p:sld xmlns:a="http://schemas.openxmlformats.org/drawingml/2006/main" xmlns:r="http://schemas.openxmlformats.org/officeDocument/2006/relationships" xmlns:p="http://schemas.openxmlformats.org/presentationml/2006/main">
-  <p:cSld>
-    <p:bg>
-      <p:bgPr>
-        <a:solidFill>
-          <a:schemeClr val="bg1"/>
-        </a:solidFill>
-        <a:effectLst/>
-      </p:bgPr>
-    </p:bg>
-    <p:spTree>
-      <p:nvGrpSpPr>
-        <p:cNvPr id="1" name=""/>
-        <p:cNvGrpSpPr/>
-        <p:nvPr/>
-      </p:nvGrpSpPr>
-      <p:grpSpPr>
-        <a:xfrm>
-          <a:off x="0" y="0"/>
-          <a:ext cx="0" cy="0"/>
-          <a:chOff x="0" y="0"/>
-          <a:chExt cx="0" cy="0"/>
-        </a:xfrm>
-      </p:grpSpPr>
-      <p:pic>
-        <p:nvPicPr>
-          <p:cNvPr id="13" name="Picture 12"/>
-          <p:cNvPicPr>
-            <a:picLocks noChangeAspect="1"/>
-          </p:cNvPicPr>
-          <p:nvPr/>
-        </p:nvPicPr>
-        <p:blipFill rotWithShape="1">
-          <a:blip r:embed="rId3" cstate="print">
-            <a:extLst>
-              <a:ext uri="{28A0092B-C50C-407E-A947-70E740481C1C}">
-                <a14:useLocalDpi xmlns:a14="http://schemas.microsoft.com/office/drawing/2010/main" xmlns="" val="0"/>
-              </a:ext>
-            </a:extLst>
-          </a:blip>
-          <a:srcRect l="31468" t="5245" r="31818" b="5594"/>
-          <a:stretch/>
-        </p:blipFill>
-        <p:spPr bwMode="auto">
-          <a:xfrm>
-            <a:off x="5300579" y="1634808"/>
-            <a:ext cx="1786021" cy="3470592"/>
-          </a:xfrm>
-          <a:prstGeom prst="rect">
-            <a:avLst/>
-          </a:prstGeom>
-          <a:ln>
-            <a:noFill/>
-          </a:ln>
-          <a:extLst>
-            <a:ext uri="{53640926-AAD7-44D8-BBD7-CCE9431645EC}">
-              <a14:shadowObscured xmlns:a14="http://schemas.microsoft.com/office/drawing/2010/main" xmlns=""/>
-            </a:ext>
-          </a:extLst>
-        </p:spPr>
-      </p:pic>
-      <p:sp>
-        <p:nvSpPr>
-          <p:cNvPr id="14" name="Flowchart: Alternate Process 13"/>
-          <p:cNvSpPr/>
-          <p:nvPr/>
-        </p:nvSpPr>
-        <p:spPr>
-          <a:xfrm>
-            <a:off x="5606753" y="2587519"/>
-            <a:ext cx="1173223" cy="644947"/>
-          </a:xfrm>
-          <a:prstGeom prst="flowChartAlternateProcess">
-            <a:avLst/>
-          </a:prstGeom>
-        </p:spPr>
-        <p:style>
-          <a:lnRef idx="2">
-            <a:schemeClr val="accent1">
-              <a:shade val="50000"/>
-            </a:schemeClr>
-          </a:lnRef>
-          <a:fillRef idx="1">
-            <a:schemeClr val="accent1"/>
-          </a:fillRef>
-          <a:effectRef idx="0">
-            <a:schemeClr val="accent1"/>
-          </a:effectRef>
-          <a:fontRef idx="minor">
-            <a:schemeClr val="lt1"/>
-          </a:fontRef>
-        </p:style>
-        <p:txBody>
-          <a:bodyPr rot="0" spcFirstLastPara="0" vert="horz" wrap="square" lIns="91440" tIns="45720" rIns="91440" bIns="45720" numCol="1" spcCol="0" rtlCol="0" fromWordArt="0" anchor="ctr" anchorCtr="0" forceAA="0" compatLnSpc="1">
-            <a:prstTxWarp prst="textNoShape">
-              <a:avLst/>
-            </a:prstTxWarp>
-            <a:noAutofit/>
-          </a:bodyPr>
-          <a:lstStyle/>
-          <a:p>
-            <a:pPr marL="0" marR="0" algn="ctr">
-              <a:lnSpc>
-                <a:spcPct val="115000"/>
-              </a:lnSpc>
-              <a:spcBef>
-                <a:spcPts val="0"/>
-              </a:spcBef>
-              <a:spcAft>
-                <a:spcPts val="1000"/>
-              </a:spcAft>
-            </a:pPr>
-            <a:r>
-              <a:rPr lang="en-US" sz="2800" b="1" dirty="0">
-                <a:effectLst/>
-                <a:ea typeface="Calibri"/>
-                <a:cs typeface="Cordia New"/>
-              </a:rPr>
-              <a:t>Start</a:t>
-            </a:r>
-            <a:endParaRPr lang="en-US" sz="2800" dirty="0">
-              <a:effectLst/>
-              <a:ea typeface="Calibri"/>
-              <a:cs typeface="Cordia New"/>
-            </a:endParaRPr>
-          </a:p>
-        </p:txBody>
-      </p:sp>
-      <p:sp>
-        <p:nvSpPr>
-          <p:cNvPr id="12" name="Pentagon 11"/>
-          <p:cNvSpPr/>
-          <p:nvPr/>
-        </p:nvSpPr>
-        <p:spPr>
-          <a:xfrm>
-            <a:off x="1371600" y="1922383"/>
-            <a:ext cx="3510519" cy="2620165"/>
-          </a:xfrm>
-          <a:prstGeom prst="homePlate">
-            <a:avLst/>
-          </a:prstGeom>
-        </p:spPr>
-        <p:style>
-          <a:lnRef idx="2">
-            <a:schemeClr val="accent1"/>
-          </a:lnRef>
-          <a:fillRef idx="1">
-            <a:schemeClr val="lt1"/>
-          </a:fillRef>
-          <a:effectRef idx="0">
-            <a:schemeClr val="accent1"/>
-          </a:effectRef>
-          <a:fontRef idx="minor">
-            <a:schemeClr val="dk1"/>
-          </a:fontRef>
-        </p:style>
-        <p:txBody>
-          <a:bodyPr rot="0" spcFirstLastPara="0" vert="horz" wrap="square" lIns="91440" tIns="45720" rIns="91440" bIns="45720" numCol="1" spcCol="0" rtlCol="0" fromWordArt="0" anchor="ctr" anchorCtr="0" forceAA="0" compatLnSpc="1">
-            <a:prstTxWarp prst="textNoShape">
-              <a:avLst/>
-            </a:prstTxWarp>
-            <a:noAutofit/>
-          </a:bodyPr>
-          <a:lstStyle/>
-          <a:p>
-            <a:pPr marL="0" marR="0">
-              <a:lnSpc>
-                <a:spcPct val="115000"/>
-              </a:lnSpc>
-              <a:spcBef>
-                <a:spcPts val="0"/>
-              </a:spcBef>
-              <a:spcAft>
-                <a:spcPts val="0"/>
-              </a:spcAft>
-            </a:pPr>
-            <a:r>
-              <a:rPr lang="en-US" sz="3200" dirty="0">
-                <a:effectLst/>
-                <a:ea typeface="Calibri"/>
-                <a:cs typeface="Cordia New"/>
-              </a:rPr>
-              <a:t>Turn on GPS </a:t>
-            </a:r>
-          </a:p>
-          <a:p>
-            <a:pPr marL="0" marR="0">
-              <a:lnSpc>
-                <a:spcPct val="115000"/>
-              </a:lnSpc>
-              <a:spcBef>
-                <a:spcPts val="0"/>
-              </a:spcBef>
-              <a:spcAft>
-                <a:spcPts val="0"/>
-              </a:spcAft>
-            </a:pPr>
-            <a:r>
-              <a:rPr lang="en-US" sz="3200" dirty="0">
-                <a:effectLst/>
-                <a:ea typeface="Calibri"/>
-                <a:cs typeface="Cordia New"/>
-              </a:rPr>
-              <a:t>and</a:t>
-            </a:r>
-          </a:p>
-          <a:p>
-            <a:pPr marL="0" marR="0">
-              <a:lnSpc>
-                <a:spcPct val="115000"/>
-              </a:lnSpc>
-              <a:spcBef>
-                <a:spcPts val="0"/>
-              </a:spcBef>
-              <a:spcAft>
-                <a:spcPts val="0"/>
-              </a:spcAft>
-            </a:pPr>
-            <a:r>
-              <a:rPr lang="en-US" sz="3200" dirty="0">
-                <a:effectLst/>
-                <a:ea typeface="Calibri"/>
-                <a:cs typeface="Cordia New"/>
-              </a:rPr>
-              <a:t>run program</a:t>
-            </a:r>
-          </a:p>
-        </p:txBody>
-      </p:sp>
-    </p:spTree>
-    <p:extLst>
-      <p:ext uri="{BB962C8B-B14F-4D97-AF65-F5344CB8AC3E}">
-        <p14:creationId xmlns:p14="http://schemas.microsoft.com/office/powerpoint/2010/main" xmlns="" val="315046874"/>
-      </p:ext>
-    </p:extLst>
-  </p:cSld>
-  <p:clrMapOvr>
-    <a:masterClrMapping/>
-  </p:clrMapOvr>
-  <p:timing>
-    <p:tnLst>
-      <p:par>
-        <p:cTn id="1" dur="indefinite" restart="never" nodeType="tmRoot">
-          <p:childTnLst>
-            <p:seq concurrent="1" nextAc="seek">
-              <p:cTn id="2" dur="indefinite" nodeType="mainSeq">
-                <p:childTnLst>
-                  <p:par>
-                    <p:cTn id="3" fill="hold">
-                      <p:stCondLst>
-                        <p:cond delay="indefinite"/>
-                      </p:stCondLst>
-                      <p:childTnLst>
-                        <p:par>
-                          <p:cTn id="4" fill="hold">
-                            <p:stCondLst>
-                              <p:cond delay="0"/>
-                            </p:stCondLst>
-                            <p:childTnLst>
-                              <p:par>
-                                <p:cTn id="5" presetID="10" presetClass="entr" presetSubtype="0" fill="hold" grpId="0" nodeType="clickEffect">
-                                  <p:stCondLst>
-                                    <p:cond delay="0"/>
-                                  </p:stCondLst>
-                                  <p:childTnLst>
-                                    <p:set>
-                                      <p:cBhvr>
-                                        <p:cTn id="6" dur="1" fill="hold">
-                                          <p:stCondLst>
-                                            <p:cond delay="0"/>
-                                          </p:stCondLst>
-                                        </p:cTn>
-                                        <p:tgtEl>
-                                          <p:spTgt spid="12"/>
-                                        </p:tgtEl>
-                                        <p:attrNameLst>
-                                          <p:attrName>style.visibility</p:attrName>
-                                        </p:attrNameLst>
-                                      </p:cBhvr>
-                                      <p:to>
-                                        <p:strVal val="visible"/>
-                                      </p:to>
-                                    </p:set>
-                                    <p:animEffect transition="in" filter="fade">
-                                      <p:cBhvr>
-                                        <p:cTn id="7" dur="500"/>
-                                        <p:tgtEl>
-                                          <p:spTgt spid="12"/>
-                                        </p:tgtEl>
-                                      </p:cBhvr>
-                                    </p:animEffect>
-                                  </p:childTnLst>
-                                </p:cTn>
-                              </p:par>
-                              <p:par>
-                                <p:cTn id="8" presetID="10" presetClass="entr" presetSubtype="0" fill="hold" grpId="0" nodeType="withEffect">
-                                  <p:stCondLst>
-                                    <p:cond delay="0"/>
-                                  </p:stCondLst>
-                                  <p:childTnLst>
-                                    <p:set>
-                                      <p:cBhvr>
-                                        <p:cTn id="9" dur="1" fill="hold">
-                                          <p:stCondLst>
-                                            <p:cond delay="0"/>
-                                          </p:stCondLst>
-                                        </p:cTn>
-                                        <p:tgtEl>
-                                          <p:spTgt spid="14"/>
-                                        </p:tgtEl>
-                                        <p:attrNameLst>
-                                          <p:attrName>style.visibility</p:attrName>
-                                        </p:attrNameLst>
-                                      </p:cBhvr>
-                                      <p:to>
-                                        <p:strVal val="visible"/>
-                                      </p:to>
-                                    </p:set>
-                                    <p:animEffect transition="in" filter="fade">
-                                      <p:cBhvr>
-                                        <p:cTn id="10" dur="500"/>
-                                        <p:tgtEl>
-                                          <p:spTgt spid="14"/>
-                                        </p:tgtEl>
-                                      </p:cBhvr>
-                                    </p:animEffect>
-                                  </p:childTnLst>
-                                </p:cTn>
-                              </p:par>
-                            </p:childTnLst>
-                          </p:cTn>
-                        </p:par>
-                      </p:childTnLst>
-                    </p:cTn>
-                  </p:par>
-                </p:childTnLst>
-              </p:cTn>
-              <p:prevCondLst>
-                <p:cond evt="onPrev" delay="0">
-                  <p:tgtEl>
-                    <p:sldTgt/>
-                  </p:tgtEl>
-                </p:cond>
-              </p:prevCondLst>
-              <p:nextCondLst>
-                <p:cond evt="onNext" delay="0">
-                  <p:tgtEl>
-                    <p:sldTgt/>
-                  </p:tgtEl>
-                </p:cond>
-              </p:nextCondLst>
-            </p:seq>
-          </p:childTnLst>
-        </p:cTn>
-      </p:par>
-    </p:tnLst>
-    <p:bldLst>
-      <p:bldP spid="14" grpId="0" animBg="1"/>
-      <p:bldP spid="12" grpId="0" animBg="1"/>
-    </p:bldLst>
-  </p:timing>
-</p:sld>
-</file>
-
-<file path=ppt/slides/slide5.xml><?xml version="1.0" encoding="utf-8"?>
-<p:sld xmlns:a="http://schemas.openxmlformats.org/drawingml/2006/main" xmlns:r="http://schemas.openxmlformats.org/officeDocument/2006/relationships" xmlns:p="http://schemas.openxmlformats.org/presentationml/2006/main">
-  <p:cSld>
-    <p:bg>
-      <p:bgPr>
-        <a:solidFill>
-          <a:schemeClr val="bg1"/>
-        </a:solidFill>
-        <a:effectLst/>
-      </p:bgPr>
-    </p:bg>
-    <p:spTree>
-      <p:nvGrpSpPr>
-        <p:cNvPr id="1" name=""/>
-        <p:cNvGrpSpPr/>
-        <p:nvPr/>
-      </p:nvGrpSpPr>
-      <p:grpSpPr>
-        <a:xfrm>
-          <a:off x="0" y="0"/>
-          <a:ext cx="0" cy="0"/>
-          <a:chOff x="0" y="0"/>
-          <a:chExt cx="0" cy="0"/>
-        </a:xfrm>
-      </p:grpSpPr>
-      <p:pic>
-        <p:nvPicPr>
-          <p:cNvPr id="13" name="Picture 12"/>
-          <p:cNvPicPr>
-            <a:picLocks noChangeAspect="1"/>
-          </p:cNvPicPr>
-          <p:nvPr/>
-        </p:nvPicPr>
-        <p:blipFill rotWithShape="1">
-          <a:blip r:embed="rId3" cstate="print">
-            <a:extLst>
-              <a:ext uri="{28A0092B-C50C-407E-A947-70E740481C1C}">
-                <a14:useLocalDpi xmlns:a14="http://schemas.microsoft.com/office/drawing/2010/main" xmlns="" val="0"/>
-              </a:ext>
-            </a:extLst>
-          </a:blip>
-          <a:srcRect l="31468" t="5245" r="31818" b="5594"/>
-          <a:stretch/>
-        </p:blipFill>
-        <p:spPr bwMode="auto">
-          <a:xfrm>
-            <a:off x="5300579" y="1634808"/>
-            <a:ext cx="1786021" cy="3470592"/>
-          </a:xfrm>
-          <a:prstGeom prst="rect">
-            <a:avLst/>
-          </a:prstGeom>
-          <a:ln>
-            <a:noFill/>
-          </a:ln>
-          <a:extLst>
-            <a:ext uri="{53640926-AAD7-44D8-BBD7-CCE9431645EC}">
-              <a14:shadowObscured xmlns:a14="http://schemas.microsoft.com/office/drawing/2010/main" xmlns=""/>
-            </a:ext>
-          </a:extLst>
-        </p:spPr>
-      </p:pic>
-      <p:sp>
-        <p:nvSpPr>
-          <p:cNvPr id="14" name="Flowchart: Alternate Process 13"/>
-          <p:cNvSpPr/>
-          <p:nvPr/>
-        </p:nvSpPr>
-        <p:spPr>
-          <a:xfrm>
-            <a:off x="5606753" y="2536902"/>
-            <a:ext cx="1173223" cy="644947"/>
-          </a:xfrm>
-          <a:prstGeom prst="flowChartAlternateProcess">
-            <a:avLst/>
-          </a:prstGeom>
-        </p:spPr>
-        <p:style>
-          <a:lnRef idx="2">
-            <a:schemeClr val="accent1">
-              <a:shade val="50000"/>
-            </a:schemeClr>
-          </a:lnRef>
-          <a:fillRef idx="1">
-            <a:schemeClr val="accent1"/>
-          </a:fillRef>
-          <a:effectRef idx="0">
-            <a:schemeClr val="accent1"/>
-          </a:effectRef>
-          <a:fontRef idx="minor">
-            <a:schemeClr val="lt1"/>
-          </a:fontRef>
-        </p:style>
-        <p:txBody>
-          <a:bodyPr rot="0" spcFirstLastPara="0" vert="horz" wrap="square" lIns="91440" tIns="45720" rIns="91440" bIns="45720" numCol="1" spcCol="0" rtlCol="0" fromWordArt="0" anchor="ctr" anchorCtr="0" forceAA="0" compatLnSpc="1">
-            <a:prstTxWarp prst="textNoShape">
-              <a:avLst/>
-            </a:prstTxWarp>
-            <a:noAutofit/>
-          </a:bodyPr>
-          <a:lstStyle/>
-          <a:p>
-            <a:pPr marL="0" marR="0" algn="ctr">
-              <a:lnSpc>
-                <a:spcPct val="115000"/>
-              </a:lnSpc>
-              <a:spcBef>
-                <a:spcPts val="0"/>
-              </a:spcBef>
-              <a:spcAft>
-                <a:spcPts val="1000"/>
-              </a:spcAft>
-            </a:pPr>
-            <a:r>
-              <a:rPr lang="en-US" sz="2800" b="1" dirty="0" smtClean="0">
-                <a:ea typeface="Calibri"/>
-                <a:cs typeface="Cordia New"/>
-              </a:rPr>
-              <a:t>Pause</a:t>
-            </a:r>
-            <a:endParaRPr lang="en-US" sz="2800" dirty="0">
-              <a:effectLst/>
-              <a:ea typeface="Calibri"/>
-              <a:cs typeface="Cordia New"/>
-            </a:endParaRPr>
-          </a:p>
-        </p:txBody>
-      </p:sp>
-      <p:sp>
-        <p:nvSpPr>
-          <p:cNvPr id="12" name="Pentagon 11"/>
-          <p:cNvSpPr/>
-          <p:nvPr/>
-        </p:nvSpPr>
-        <p:spPr>
-          <a:xfrm>
-            <a:off x="1371600" y="1922383"/>
-            <a:ext cx="3510519" cy="2620165"/>
-          </a:xfrm>
-          <a:prstGeom prst="homePlate">
-            <a:avLst/>
-          </a:prstGeom>
-        </p:spPr>
-        <p:style>
-          <a:lnRef idx="2">
-            <a:schemeClr val="accent1"/>
-          </a:lnRef>
-          <a:fillRef idx="1">
-            <a:schemeClr val="lt1"/>
-          </a:fillRef>
-          <a:effectRef idx="0">
-            <a:schemeClr val="accent1"/>
-          </a:effectRef>
-          <a:fontRef idx="minor">
-            <a:schemeClr val="dk1"/>
-          </a:fontRef>
-        </p:style>
-        <p:txBody>
-          <a:bodyPr rot="0" spcFirstLastPara="0" vert="horz" wrap="square" lIns="91440" tIns="45720" rIns="91440" bIns="45720" numCol="1" spcCol="0" rtlCol="0" fromWordArt="0" anchor="ctr" anchorCtr="0" forceAA="0" compatLnSpc="1">
-            <a:prstTxWarp prst="textNoShape">
-              <a:avLst/>
-            </a:prstTxWarp>
-            <a:noAutofit/>
-          </a:bodyPr>
-          <a:lstStyle/>
-          <a:p>
-            <a:r>
-              <a:rPr lang="en-US" sz="3200" dirty="0"/>
-              <a:t>Insert latitude</a:t>
-            </a:r>
-          </a:p>
-          <a:p>
-            <a:r>
-              <a:rPr lang="en-US" sz="3200" dirty="0"/>
-              <a:t>and longitude</a:t>
-            </a:r>
-          </a:p>
-          <a:p>
-            <a:r>
-              <a:rPr lang="en-US" sz="3200" dirty="0"/>
-              <a:t>into database</a:t>
-            </a:r>
-          </a:p>
-        </p:txBody>
-      </p:sp>
-      <p:sp>
-        <p:nvSpPr>
-          <p:cNvPr id="5" name="Flowchart: Alternate Process 4"/>
-          <p:cNvSpPr/>
-          <p:nvPr/>
-        </p:nvSpPr>
-        <p:spPr>
-          <a:xfrm>
-            <a:off x="5608577" y="3319487"/>
-            <a:ext cx="1173223" cy="644947"/>
-          </a:xfrm>
-          <a:prstGeom prst="flowChartAlternateProcess">
-            <a:avLst/>
-          </a:prstGeom>
-        </p:spPr>
-        <p:style>
-          <a:lnRef idx="2">
-            <a:schemeClr val="accent1">
-              <a:shade val="50000"/>
-            </a:schemeClr>
-          </a:lnRef>
-          <a:fillRef idx="1">
-            <a:schemeClr val="accent1"/>
-          </a:fillRef>
-          <a:effectRef idx="0">
-            <a:schemeClr val="accent1"/>
-          </a:effectRef>
-          <a:fontRef idx="minor">
-            <a:schemeClr val="lt1"/>
-          </a:fontRef>
-        </p:style>
-        <p:txBody>
-          <a:bodyPr rot="0" spcFirstLastPara="0" vert="horz" wrap="square" lIns="91440" tIns="45720" rIns="91440" bIns="45720" numCol="1" spcCol="0" rtlCol="0" fromWordArt="0" anchor="ctr" anchorCtr="0" forceAA="0" compatLnSpc="1">
-            <a:prstTxWarp prst="textNoShape">
-              <a:avLst/>
-            </a:prstTxWarp>
-            <a:noAutofit/>
-          </a:bodyPr>
-          <a:lstStyle/>
-          <a:p>
-            <a:pPr marL="0" marR="0" algn="ctr">
-              <a:lnSpc>
-                <a:spcPct val="115000"/>
-              </a:lnSpc>
-              <a:spcBef>
-                <a:spcPts val="0"/>
-              </a:spcBef>
-              <a:spcAft>
-                <a:spcPts val="1000"/>
-              </a:spcAft>
-            </a:pPr>
-            <a:r>
-              <a:rPr lang="en-US" sz="2800" b="1" dirty="0" smtClean="0">
-                <a:effectLst/>
-                <a:ea typeface="Calibri"/>
-                <a:cs typeface="Cordia New"/>
-              </a:rPr>
-              <a:t>Stop</a:t>
-            </a:r>
-            <a:endParaRPr lang="en-US" sz="2800" dirty="0">
-              <a:effectLst/>
-              <a:ea typeface="Calibri"/>
-              <a:cs typeface="Cordia New"/>
-            </a:endParaRPr>
-          </a:p>
-        </p:txBody>
-      </p:sp>
-    </p:spTree>
-    <p:extLst>
-      <p:ext uri="{BB962C8B-B14F-4D97-AF65-F5344CB8AC3E}">
-        <p14:creationId xmlns:p14="http://schemas.microsoft.com/office/powerpoint/2010/main" xmlns="" val="1498823684"/>
-      </p:ext>
-    </p:extLst>
-  </p:cSld>
-  <p:clrMapOvr>
-    <a:masterClrMapping/>
-  </p:clrMapOvr>
-  <p:timing>
-    <p:tnLst>
-      <p:par>
-        <p:cTn id="1" dur="indefinite" restart="never" nodeType="tmRoot">
-          <p:childTnLst>
-            <p:seq concurrent="1" nextAc="seek">
-              <p:cTn id="2" dur="indefinite" nodeType="mainSeq">
-                <p:childTnLst>
-                  <p:par>
-                    <p:cTn id="3" fill="hold">
-                      <p:stCondLst>
-                        <p:cond delay="indefinite"/>
-                      </p:stCondLst>
-                      <p:childTnLst>
-                        <p:par>
-                          <p:cTn id="4" fill="hold">
-                            <p:stCondLst>
-                              <p:cond delay="0"/>
-                            </p:stCondLst>
-                            <p:childTnLst>
-                              <p:par>
-                                <p:cTn id="5" presetID="10" presetClass="entr" presetSubtype="0" fill="hold" grpId="0" nodeType="clickEffect">
-                                  <p:stCondLst>
-                                    <p:cond delay="0"/>
-                                  </p:stCondLst>
-                                  <p:childTnLst>
-                                    <p:set>
-                                      <p:cBhvr>
-                                        <p:cTn id="6" dur="1" fill="hold">
-                                          <p:stCondLst>
-                                            <p:cond delay="0"/>
-                                          </p:stCondLst>
-                                        </p:cTn>
-                                        <p:tgtEl>
-                                          <p:spTgt spid="12"/>
-                                        </p:tgtEl>
-                                        <p:attrNameLst>
-                                          <p:attrName>style.visibility</p:attrName>
-                                        </p:attrNameLst>
-                                      </p:cBhvr>
-                                      <p:to>
-                                        <p:strVal val="visible"/>
-                                      </p:to>
-                                    </p:set>
-                                    <p:animEffect transition="in" filter="fade">
-                                      <p:cBhvr>
-                                        <p:cTn id="7" dur="500"/>
-                                        <p:tgtEl>
-                                          <p:spTgt spid="12"/>
-                                        </p:tgtEl>
-                                      </p:cBhvr>
-                                    </p:animEffect>
-                                  </p:childTnLst>
-                                </p:cTn>
-                              </p:par>
-                              <p:par>
-                                <p:cTn id="8" presetID="10" presetClass="entr" presetSubtype="0" fill="hold" grpId="0" nodeType="withEffect">
-                                  <p:stCondLst>
-                                    <p:cond delay="0"/>
-                                  </p:stCondLst>
-                                  <p:childTnLst>
-                                    <p:set>
-                                      <p:cBhvr>
-                                        <p:cTn id="9" dur="1" fill="hold">
-                                          <p:stCondLst>
-                                            <p:cond delay="0"/>
-                                          </p:stCondLst>
-                                        </p:cTn>
-                                        <p:tgtEl>
-                                          <p:spTgt spid="14"/>
-                                        </p:tgtEl>
-                                        <p:attrNameLst>
-                                          <p:attrName>style.visibility</p:attrName>
-                                        </p:attrNameLst>
-                                      </p:cBhvr>
-                                      <p:to>
-                                        <p:strVal val="visible"/>
-                                      </p:to>
-                                    </p:set>
-                                    <p:animEffect transition="in" filter="fade">
-                                      <p:cBhvr>
-                                        <p:cTn id="10" dur="500"/>
-                                        <p:tgtEl>
-                                          <p:spTgt spid="14"/>
-                                        </p:tgtEl>
-                                      </p:cBhvr>
-                                    </p:animEffect>
-                                  </p:childTnLst>
-                                </p:cTn>
-                              </p:par>
-                              <p:par>
-                                <p:cTn id="11" presetID="10" presetClass="entr" presetSubtype="0" fill="hold" grpId="0" nodeType="withEffect">
-                                  <p:stCondLst>
-                                    <p:cond delay="0"/>
-                                  </p:stCondLst>
-                                  <p:childTnLst>
-                                    <p:set>
-                                      <p:cBhvr>
-                                        <p:cTn id="12" dur="1" fill="hold">
-                                          <p:stCondLst>
-                                            <p:cond delay="0"/>
-                                          </p:stCondLst>
-                                        </p:cTn>
-                                        <p:tgtEl>
-                                          <p:spTgt spid="5"/>
-                                        </p:tgtEl>
-                                        <p:attrNameLst>
-                                          <p:attrName>style.visibility</p:attrName>
-                                        </p:attrNameLst>
-                                      </p:cBhvr>
-                                      <p:to>
-                                        <p:strVal val="visible"/>
-                                      </p:to>
-                                    </p:set>
-                                    <p:animEffect transition="in" filter="fade">
-                                      <p:cBhvr>
-                                        <p:cTn id="13" dur="500"/>
-                                        <p:tgtEl>
-                                          <p:spTgt spid="5"/>
-                                        </p:tgtEl>
-                                      </p:cBhvr>
-                                    </p:animEffect>
-                                  </p:childTnLst>
-                                </p:cTn>
-                              </p:par>
-                            </p:childTnLst>
-                          </p:cTn>
-                        </p:par>
-                      </p:childTnLst>
-                    </p:cTn>
-                  </p:par>
-                </p:childTnLst>
-              </p:cTn>
-              <p:prevCondLst>
-                <p:cond evt="onPrev" delay="0">
-                  <p:tgtEl>
-                    <p:sldTgt/>
-                  </p:tgtEl>
-                </p:cond>
-              </p:prevCondLst>
-              <p:nextCondLst>
-                <p:cond evt="onNext" delay="0">
-                  <p:tgtEl>
-                    <p:sldTgt/>
-                  </p:tgtEl>
-                </p:cond>
-              </p:nextCondLst>
-            </p:seq>
-          </p:childTnLst>
-        </p:cTn>
-      </p:par>
-    </p:tnLst>
-    <p:bldLst>
-      <p:bldP spid="14" grpId="0" animBg="1"/>
-      <p:bldP spid="12" grpId="0" animBg="1"/>
-      <p:bldP spid="5" grpId="0" animBg="1"/>
-    </p:bldLst>
-  </p:timing>
-</p:sld>
-</file>
-
-<file path=ppt/slides/slide6.xml><?xml version="1.0" encoding="utf-8"?>
+<file path=ppt/slides/slide10.xml><?xml version="1.0" encoding="utf-8"?>
 <p:sld xmlns:a="http://schemas.openxmlformats.org/drawingml/2006/main" xmlns:r="http://schemas.openxmlformats.org/officeDocument/2006/relationships" xmlns:p="http://schemas.openxmlformats.org/presentationml/2006/main">
   <p:cSld>
     <p:bg>
@@ -7727,7 +6667,7 @@
           <a:blip r:embed="rId2" cstate="print">
             <a:extLst>
               <a:ext uri="{28A0092B-C50C-407E-A947-70E740481C1C}">
-                <a14:useLocalDpi xmlns:a14="http://schemas.microsoft.com/office/drawing/2010/main" xmlns="" val="0"/>
+                <a14:useLocalDpi xmlns:a14="http://schemas.microsoft.com/office/drawing/2010/main" val="0"/>
               </a:ext>
             </a:extLst>
           </a:blip>
@@ -7747,74 +6687,11 @@
           </a:ln>
           <a:extLst>
             <a:ext uri="{53640926-AAD7-44D8-BBD7-CCE9431645EC}">
-              <a14:shadowObscured xmlns:a14="http://schemas.microsoft.com/office/drawing/2010/main" xmlns=""/>
+              <a14:shadowObscured xmlns:a14="http://schemas.microsoft.com/office/drawing/2010/main"/>
             </a:ext>
           </a:extLst>
         </p:spPr>
       </p:pic>
-      <p:sp>
-        <p:nvSpPr>
-          <p:cNvPr id="5" name="Flowchart: Alternate Process 4"/>
-          <p:cNvSpPr/>
-          <p:nvPr/>
-        </p:nvSpPr>
-        <p:spPr>
-          <a:xfrm>
-            <a:off x="5606977" y="2744360"/>
-            <a:ext cx="1173223" cy="976209"/>
-          </a:xfrm>
-          <a:prstGeom prst="flowChartAlternateProcess">
-            <a:avLst/>
-          </a:prstGeom>
-        </p:spPr>
-        <p:style>
-          <a:lnRef idx="2">
-            <a:schemeClr val="accent1">
-              <a:shade val="50000"/>
-            </a:schemeClr>
-          </a:lnRef>
-          <a:fillRef idx="1">
-            <a:schemeClr val="accent1"/>
-          </a:fillRef>
-          <a:effectRef idx="0">
-            <a:schemeClr val="accent1"/>
-          </a:effectRef>
-          <a:fontRef idx="minor">
-            <a:schemeClr val="lt1"/>
-          </a:fontRef>
-        </p:style>
-        <p:txBody>
-          <a:bodyPr rot="0" spcFirstLastPara="0" vert="horz" wrap="square" lIns="91440" tIns="45720" rIns="91440" bIns="45720" numCol="1" spcCol="0" rtlCol="0" fromWordArt="0" anchor="ctr" anchorCtr="0" forceAA="0" compatLnSpc="1">
-            <a:prstTxWarp prst="textNoShape">
-              <a:avLst/>
-            </a:prstTxWarp>
-            <a:noAutofit/>
-          </a:bodyPr>
-          <a:lstStyle/>
-          <a:p>
-            <a:pPr marL="0" marR="0" algn="ctr">
-              <a:spcBef>
-                <a:spcPts val="0"/>
-              </a:spcBef>
-              <a:spcAft>
-                <a:spcPts val="1000"/>
-              </a:spcAft>
-            </a:pPr>
-            <a:r>
-              <a:rPr lang="en-US" sz="2800" b="1" dirty="0" smtClean="0">
-                <a:ea typeface="Calibri"/>
-                <a:cs typeface="Cordia New"/>
-              </a:rPr>
-              <a:t>Continue</a:t>
-            </a:r>
-            <a:endParaRPr lang="en-US" sz="2800" dirty="0">
-              <a:effectLst/>
-              <a:ea typeface="Calibri"/>
-              <a:cs typeface="Cordia New"/>
-            </a:endParaRPr>
-          </a:p>
-        </p:txBody>
-      </p:sp>
       <p:sp>
         <p:nvSpPr>
           <p:cNvPr id="6" name="Pentagon 5"/>
@@ -7855,7 +6732,13 @@
           <a:p>
             <a:r>
               <a:rPr lang="en-US" sz="3200" dirty="0"/>
-              <a:t>Wait for user tap to continue</a:t>
+              <a:t>Stop your travel</a:t>
+            </a:r>
+          </a:p>
+          <a:p>
+            <a:r>
+              <a:rPr lang="en-US" sz="3200" dirty="0"/>
+              <a:t>Stop  program</a:t>
             </a:r>
           </a:p>
         </p:txBody>
@@ -7916,356 +6799,6 @@
                 <a:ea typeface="Calibri"/>
                 <a:cs typeface="Cordia New"/>
               </a:rPr>
-              <a:t>Pause</a:t>
-            </a:r>
-            <a:endParaRPr lang="en-US" sz="2800" dirty="0">
-              <a:effectLst/>
-              <a:ea typeface="Calibri"/>
-              <a:cs typeface="Cordia New"/>
-            </a:endParaRPr>
-          </a:p>
-        </p:txBody>
-      </p:sp>
-    </p:spTree>
-    <p:extLst>
-      <p:ext uri="{BB962C8B-B14F-4D97-AF65-F5344CB8AC3E}">
-        <p14:creationId xmlns:p14="http://schemas.microsoft.com/office/powerpoint/2010/main" xmlns="" val="819896303"/>
-      </p:ext>
-    </p:extLst>
-  </p:cSld>
-  <p:clrMapOvr>
-    <a:masterClrMapping/>
-  </p:clrMapOvr>
-  <p:timing>
-    <p:tnLst>
-      <p:par>
-        <p:cTn id="1" dur="indefinite" restart="never" nodeType="tmRoot">
-          <p:childTnLst>
-            <p:seq concurrent="1" nextAc="seek">
-              <p:cTn id="2" dur="indefinite" nodeType="mainSeq">
-                <p:childTnLst>
-                  <p:par>
-                    <p:cTn id="3" fill="hold">
-                      <p:stCondLst>
-                        <p:cond delay="indefinite"/>
-                      </p:stCondLst>
-                      <p:childTnLst>
-                        <p:par>
-                          <p:cTn id="4" fill="hold">
-                            <p:stCondLst>
-                              <p:cond delay="0"/>
-                            </p:stCondLst>
-                            <p:childTnLst>
-                              <p:par>
-                                <p:cTn id="5" presetID="10" presetClass="entr" presetSubtype="0" fill="hold" grpId="0" nodeType="clickEffect">
-                                  <p:stCondLst>
-                                    <p:cond delay="0"/>
-                                  </p:stCondLst>
-                                  <p:childTnLst>
-                                    <p:set>
-                                      <p:cBhvr>
-                                        <p:cTn id="6" dur="1" fill="hold">
-                                          <p:stCondLst>
-                                            <p:cond delay="0"/>
-                                          </p:stCondLst>
-                                        </p:cTn>
-                                        <p:tgtEl>
-                                          <p:spTgt spid="6"/>
-                                        </p:tgtEl>
-                                        <p:attrNameLst>
-                                          <p:attrName>style.visibility</p:attrName>
-                                        </p:attrNameLst>
-                                      </p:cBhvr>
-                                      <p:to>
-                                        <p:strVal val="visible"/>
-                                      </p:to>
-                                    </p:set>
-                                    <p:animEffect transition="in" filter="fade">
-                                      <p:cBhvr>
-                                        <p:cTn id="7" dur="500"/>
-                                        <p:tgtEl>
-                                          <p:spTgt spid="6"/>
-                                        </p:tgtEl>
-                                      </p:cBhvr>
-                                    </p:animEffect>
-                                  </p:childTnLst>
-                                </p:cTn>
-                              </p:par>
-                              <p:par>
-                                <p:cTn id="8" presetID="10" presetClass="entr" presetSubtype="0" fill="hold" grpId="0" nodeType="withEffect">
-                                  <p:stCondLst>
-                                    <p:cond delay="0"/>
-                                  </p:stCondLst>
-                                  <p:childTnLst>
-                                    <p:set>
-                                      <p:cBhvr>
-                                        <p:cTn id="9" dur="1" fill="hold">
-                                          <p:stCondLst>
-                                            <p:cond delay="0"/>
-                                          </p:stCondLst>
-                                        </p:cTn>
-                                        <p:tgtEl>
-                                          <p:spTgt spid="5"/>
-                                        </p:tgtEl>
-                                        <p:attrNameLst>
-                                          <p:attrName>style.visibility</p:attrName>
-                                        </p:attrNameLst>
-                                      </p:cBhvr>
-                                      <p:to>
-                                        <p:strVal val="visible"/>
-                                      </p:to>
-                                    </p:set>
-                                    <p:animEffect transition="in" filter="fade">
-                                      <p:cBhvr>
-                                        <p:cTn id="10" dur="500"/>
-                                        <p:tgtEl>
-                                          <p:spTgt spid="5"/>
-                                        </p:tgtEl>
-                                      </p:cBhvr>
-                                    </p:animEffect>
-                                  </p:childTnLst>
-                                </p:cTn>
-                              </p:par>
-                              <p:par>
-                                <p:cTn id="11" presetID="10" presetClass="entr" presetSubtype="0" fill="hold" grpId="0" nodeType="withEffect">
-                                  <p:stCondLst>
-                                    <p:cond delay="0"/>
-                                  </p:stCondLst>
-                                  <p:childTnLst>
-                                    <p:set>
-                                      <p:cBhvr>
-                                        <p:cTn id="12" dur="1" fill="hold">
-                                          <p:stCondLst>
-                                            <p:cond delay="0"/>
-                                          </p:stCondLst>
-                                        </p:cTn>
-                                        <p:tgtEl>
-                                          <p:spTgt spid="8"/>
-                                        </p:tgtEl>
-                                        <p:attrNameLst>
-                                          <p:attrName>style.visibility</p:attrName>
-                                        </p:attrNameLst>
-                                      </p:cBhvr>
-                                      <p:to>
-                                        <p:strVal val="visible"/>
-                                      </p:to>
-                                    </p:set>
-                                    <p:animEffect transition="in" filter="fade">
-                                      <p:cBhvr>
-                                        <p:cTn id="13" dur="500"/>
-                                        <p:tgtEl>
-                                          <p:spTgt spid="8"/>
-                                        </p:tgtEl>
-                                      </p:cBhvr>
-                                    </p:animEffect>
-                                  </p:childTnLst>
-                                </p:cTn>
-                              </p:par>
-                            </p:childTnLst>
-                          </p:cTn>
-                        </p:par>
-                      </p:childTnLst>
-                    </p:cTn>
-                  </p:par>
-                </p:childTnLst>
-              </p:cTn>
-              <p:prevCondLst>
-                <p:cond evt="onPrev" delay="0">
-                  <p:tgtEl>
-                    <p:sldTgt/>
-                  </p:tgtEl>
-                </p:cond>
-              </p:prevCondLst>
-              <p:nextCondLst>
-                <p:cond evt="onNext" delay="0">
-                  <p:tgtEl>
-                    <p:sldTgt/>
-                  </p:tgtEl>
-                </p:cond>
-              </p:nextCondLst>
-            </p:seq>
-          </p:childTnLst>
-        </p:cTn>
-      </p:par>
-    </p:tnLst>
-    <p:bldLst>
-      <p:bldP spid="5" grpId="0" animBg="1"/>
-      <p:bldP spid="6" grpId="0" animBg="1"/>
-      <p:bldP spid="8" grpId="0" animBg="1"/>
-    </p:bldLst>
-  </p:timing>
-</p:sld>
-</file>
-
-<file path=ppt/slides/slide7.xml><?xml version="1.0" encoding="utf-8"?>
-<p:sld xmlns:a="http://schemas.openxmlformats.org/drawingml/2006/main" xmlns:r="http://schemas.openxmlformats.org/officeDocument/2006/relationships" xmlns:p="http://schemas.openxmlformats.org/presentationml/2006/main">
-  <p:cSld>
-    <p:bg>
-      <p:bgPr>
-        <a:solidFill>
-          <a:schemeClr val="bg1"/>
-        </a:solidFill>
-        <a:effectLst/>
-      </p:bgPr>
-    </p:bg>
-    <p:spTree>
-      <p:nvGrpSpPr>
-        <p:cNvPr id="1" name=""/>
-        <p:cNvGrpSpPr/>
-        <p:nvPr/>
-      </p:nvGrpSpPr>
-      <p:grpSpPr>
-        <a:xfrm>
-          <a:off x="0" y="0"/>
-          <a:ext cx="0" cy="0"/>
-          <a:chOff x="0" y="0"/>
-          <a:chExt cx="0" cy="0"/>
-        </a:xfrm>
-      </p:grpSpPr>
-      <p:pic>
-        <p:nvPicPr>
-          <p:cNvPr id="4" name="Picture 3"/>
-          <p:cNvPicPr>
-            <a:picLocks noChangeAspect="1"/>
-          </p:cNvPicPr>
-          <p:nvPr/>
-        </p:nvPicPr>
-        <p:blipFill rotWithShape="1">
-          <a:blip r:embed="rId2" cstate="print">
-            <a:extLst>
-              <a:ext uri="{28A0092B-C50C-407E-A947-70E740481C1C}">
-                <a14:useLocalDpi xmlns:a14="http://schemas.microsoft.com/office/drawing/2010/main" xmlns="" val="0"/>
-              </a:ext>
-            </a:extLst>
-          </a:blip>
-          <a:srcRect l="31468" t="5245" r="31818" b="5594"/>
-          <a:stretch/>
-        </p:blipFill>
-        <p:spPr bwMode="auto">
-          <a:xfrm>
-            <a:off x="5300579" y="1634808"/>
-            <a:ext cx="1786021" cy="3470592"/>
-          </a:xfrm>
-          <a:prstGeom prst="rect">
-            <a:avLst/>
-          </a:prstGeom>
-          <a:ln>
-            <a:noFill/>
-          </a:ln>
-          <a:extLst>
-            <a:ext uri="{53640926-AAD7-44D8-BBD7-CCE9431645EC}">
-              <a14:shadowObscured xmlns:a14="http://schemas.microsoft.com/office/drawing/2010/main" xmlns=""/>
-            </a:ext>
-          </a:extLst>
-        </p:spPr>
-      </p:pic>
-      <p:sp>
-        <p:nvSpPr>
-          <p:cNvPr id="6" name="Pentagon 5"/>
-          <p:cNvSpPr/>
-          <p:nvPr/>
-        </p:nvSpPr>
-        <p:spPr>
-          <a:xfrm>
-            <a:off x="1371600" y="1922383"/>
-            <a:ext cx="3510519" cy="2620165"/>
-          </a:xfrm>
-          <a:prstGeom prst="homePlate">
-            <a:avLst/>
-          </a:prstGeom>
-        </p:spPr>
-        <p:style>
-          <a:lnRef idx="2">
-            <a:schemeClr val="accent1"/>
-          </a:lnRef>
-          <a:fillRef idx="1">
-            <a:schemeClr val="lt1"/>
-          </a:fillRef>
-          <a:effectRef idx="0">
-            <a:schemeClr val="accent1"/>
-          </a:effectRef>
-          <a:fontRef idx="minor">
-            <a:schemeClr val="dk1"/>
-          </a:fontRef>
-        </p:style>
-        <p:txBody>
-          <a:bodyPr rot="0" spcFirstLastPara="0" vert="horz" wrap="square" lIns="91440" tIns="45720" rIns="91440" bIns="45720" numCol="1" spcCol="0" rtlCol="0" fromWordArt="0" anchor="ctr" anchorCtr="0" forceAA="0" compatLnSpc="1">
-            <a:prstTxWarp prst="textNoShape">
-              <a:avLst/>
-            </a:prstTxWarp>
-            <a:noAutofit/>
-          </a:bodyPr>
-          <a:lstStyle/>
-          <a:p>
-            <a:r>
-              <a:rPr lang="en-US" sz="3200" dirty="0"/>
-              <a:t>Stop your travel</a:t>
-            </a:r>
-          </a:p>
-          <a:p>
-            <a:r>
-              <a:rPr lang="en-US" sz="3200" dirty="0"/>
-              <a:t>Stop  program</a:t>
-            </a:r>
-          </a:p>
-        </p:txBody>
-      </p:sp>
-      <p:sp>
-        <p:nvSpPr>
-          <p:cNvPr id="8" name="Flowchart: Alternate Process 7"/>
-          <p:cNvSpPr/>
-          <p:nvPr/>
-        </p:nvSpPr>
-        <p:spPr>
-          <a:xfrm>
-            <a:off x="1371600" y="1031621"/>
-            <a:ext cx="1173223" cy="644947"/>
-          </a:xfrm>
-          <a:prstGeom prst="flowChartAlternateProcess">
-            <a:avLst/>
-          </a:prstGeom>
-        </p:spPr>
-        <p:style>
-          <a:lnRef idx="2">
-            <a:schemeClr val="accent1">
-              <a:shade val="50000"/>
-            </a:schemeClr>
-          </a:lnRef>
-          <a:fillRef idx="1">
-            <a:schemeClr val="accent1"/>
-          </a:fillRef>
-          <a:effectRef idx="0">
-            <a:schemeClr val="accent1"/>
-          </a:effectRef>
-          <a:fontRef idx="minor">
-            <a:schemeClr val="lt1"/>
-          </a:fontRef>
-        </p:style>
-        <p:txBody>
-          <a:bodyPr rot="0" spcFirstLastPara="0" vert="horz" wrap="square" lIns="91440" tIns="45720" rIns="91440" bIns="45720" numCol="1" spcCol="0" rtlCol="0" fromWordArt="0" anchor="ctr" anchorCtr="0" forceAA="0" compatLnSpc="1">
-            <a:prstTxWarp prst="textNoShape">
-              <a:avLst/>
-            </a:prstTxWarp>
-            <a:noAutofit/>
-          </a:bodyPr>
-          <a:lstStyle/>
-          <a:p>
-            <a:pPr marL="0" marR="0" algn="ctr">
-              <a:lnSpc>
-                <a:spcPct val="115000"/>
-              </a:lnSpc>
-              <a:spcBef>
-                <a:spcPts val="0"/>
-              </a:spcBef>
-              <a:spcAft>
-                <a:spcPts val="1000"/>
-              </a:spcAft>
-            </a:pPr>
-            <a:r>
-              <a:rPr lang="en-US" sz="2800" b="1" dirty="0" smtClean="0">
-                <a:ea typeface="Calibri"/>
-                <a:cs typeface="Cordia New"/>
-              </a:rPr>
               <a:t>Stop</a:t>
             </a:r>
             <a:endParaRPr lang="en-US" sz="2800" dirty="0">
@@ -8345,7 +6878,7 @@
     </p:spTree>
     <p:extLst>
       <p:ext uri="{BB962C8B-B14F-4D97-AF65-F5344CB8AC3E}">
-        <p14:creationId xmlns:p14="http://schemas.microsoft.com/office/powerpoint/2010/main" xmlns="" val="785686850"/>
+        <p14:creationId xmlns:p14="http://schemas.microsoft.com/office/powerpoint/2010/main" val="785686850"/>
       </p:ext>
     </p:extLst>
   </p:cSld>
@@ -8531,7 +7064,7 @@
 </p:sld>
 </file>
 
-<file path=ppt/slides/slide8.xml><?xml version="1.0" encoding="utf-8"?>
+<file path=ppt/slides/slide11.xml><?xml version="1.0" encoding="utf-8"?>
 <p:sld xmlns:a="http://schemas.openxmlformats.org/drawingml/2006/main" xmlns:r="http://schemas.openxmlformats.org/officeDocument/2006/relationships" xmlns:p="http://schemas.openxmlformats.org/presentationml/2006/main">
   <p:cSld>
     <p:bg>
@@ -8568,7 +7101,7 @@
           <a:blip r:embed="rId2" cstate="print">
             <a:extLst>
               <a:ext uri="{28A0092B-C50C-407E-A947-70E740481C1C}">
-                <a14:useLocalDpi xmlns:a14="http://schemas.microsoft.com/office/drawing/2010/main" xmlns="" val="0"/>
+                <a14:useLocalDpi xmlns:a14="http://schemas.microsoft.com/office/drawing/2010/main" val="0"/>
               </a:ext>
             </a:extLst>
           </a:blip>
@@ -8588,7 +7121,7 @@
           </a:ln>
           <a:extLst>
             <a:ext uri="{53640926-AAD7-44D8-BBD7-CCE9431645EC}">
-              <a14:shadowObscured xmlns:a14="http://schemas.microsoft.com/office/drawing/2010/main" xmlns=""/>
+              <a14:shadowObscured xmlns:a14="http://schemas.microsoft.com/office/drawing/2010/main"/>
             </a:ext>
           </a:extLst>
         </p:spPr>
@@ -8730,7 +7263,7 @@
             <a:blip r:embed="rId3" cstate="print">
               <a:extLst>
                 <a:ext uri="{28A0092B-C50C-407E-A947-70E740481C1C}">
-                  <a14:useLocalDpi xmlns:a14="http://schemas.microsoft.com/office/drawing/2010/main" xmlns="" val="0"/>
+                  <a14:useLocalDpi xmlns:a14="http://schemas.microsoft.com/office/drawing/2010/main" val="0"/>
                 </a:ext>
               </a:extLst>
             </a:blip>
@@ -9597,7 +8130,7 @@
     </p:spTree>
     <p:extLst>
       <p:ext uri="{BB962C8B-B14F-4D97-AF65-F5344CB8AC3E}">
-        <p14:creationId xmlns:p14="http://schemas.microsoft.com/office/powerpoint/2010/main" xmlns="" val="215749748"/>
+        <p14:creationId xmlns:p14="http://schemas.microsoft.com/office/powerpoint/2010/main" val="215749748"/>
       </p:ext>
     </p:extLst>
   </p:cSld>
@@ -9775,6 +8308,1945 @@
       </p:par>
     </p:tnLst>
     <p:bldLst>
+      <p:bldP spid="6" grpId="0" animBg="1"/>
+      <p:bldP spid="8" grpId="0" animBg="1"/>
+    </p:bldLst>
+  </p:timing>
+</p:sld>
+</file>
+
+<file path=ppt/slides/slide2.xml><?xml version="1.0" encoding="utf-8"?>
+<p:sld xmlns:a="http://schemas.openxmlformats.org/drawingml/2006/main" xmlns:r="http://schemas.openxmlformats.org/officeDocument/2006/relationships" xmlns:p="http://schemas.openxmlformats.org/presentationml/2006/main">
+  <p:cSld>
+    <p:spTree>
+      <p:nvGrpSpPr>
+        <p:cNvPr id="1" name=""/>
+        <p:cNvGrpSpPr/>
+        <p:nvPr/>
+      </p:nvGrpSpPr>
+      <p:grpSpPr>
+        <a:xfrm>
+          <a:off x="0" y="0"/>
+          <a:ext cx="0" cy="0"/>
+          <a:chOff x="0" y="0"/>
+          <a:chExt cx="0" cy="0"/>
+        </a:xfrm>
+      </p:grpSpPr>
+      <p:sp>
+        <p:nvSpPr>
+          <p:cNvPr id="4" name="Title 3"/>
+          <p:cNvSpPr>
+            <a:spLocks noGrp="1"/>
+          </p:cNvSpPr>
+          <p:nvPr>
+            <p:ph type="title"/>
+          </p:nvPr>
+        </p:nvSpPr>
+        <p:spPr/>
+        <p:txBody>
+          <a:bodyPr/>
+          <a:lstStyle/>
+          <a:p>
+            <a:r>
+              <a:rPr lang="th-TH" dirty="0" smtClean="0"/>
+              <a:t>ทำไมจึงทำโครงงานนี้</a:t>
+            </a:r>
+            <a:endParaRPr lang="en-US" dirty="0"/>
+          </a:p>
+        </p:txBody>
+      </p:sp>
+      <p:sp>
+        <p:nvSpPr>
+          <p:cNvPr id="5" name="Content Placeholder 4"/>
+          <p:cNvSpPr>
+            <a:spLocks noGrp="1"/>
+          </p:cNvSpPr>
+          <p:nvPr>
+            <p:ph idx="1"/>
+          </p:nvPr>
+        </p:nvSpPr>
+        <p:spPr/>
+        <p:txBody>
+          <a:bodyPr/>
+          <a:lstStyle/>
+          <a:p>
+            <a:r>
+              <a:rPr lang="th-TH" dirty="0" smtClean="0"/>
+              <a:t>ทำอะไร</a:t>
+            </a:r>
+          </a:p>
+          <a:p>
+            <a:r>
+              <a:rPr lang="th-TH" dirty="0" smtClean="0"/>
+              <a:t>ทำไปทำไม</a:t>
+            </a:r>
+          </a:p>
+          <a:p>
+            <a:r>
+              <a:rPr lang="th-TH" dirty="0" smtClean="0"/>
+              <a:t>ต่างจากชาวบ้นเค้ายังไง</a:t>
+            </a:r>
+          </a:p>
+          <a:p>
+            <a:r>
+              <a:rPr lang="th-TH" dirty="0" smtClean="0"/>
+              <a:t>จะส่งอะไร</a:t>
+            </a:r>
+            <a:endParaRPr lang="en-US" dirty="0"/>
+          </a:p>
+        </p:txBody>
+      </p:sp>
+    </p:spTree>
+    <p:extLst>
+      <p:ext uri="{BB962C8B-B14F-4D97-AF65-F5344CB8AC3E}">
+        <p14:creationId xmlns:p14="http://schemas.microsoft.com/office/powerpoint/2010/main" val="96058202"/>
+      </p:ext>
+    </p:extLst>
+  </p:cSld>
+  <p:clrMapOvr>
+    <a:masterClrMapping/>
+  </p:clrMapOvr>
+  <p:timing>
+    <p:tnLst>
+      <p:par>
+        <p:cTn id="1" dur="indefinite" restart="never" nodeType="tmRoot"/>
+      </p:par>
+    </p:tnLst>
+  </p:timing>
+</p:sld>
+</file>
+
+<file path=ppt/slides/slide3.xml><?xml version="1.0" encoding="utf-8"?>
+<p:sld xmlns:a="http://schemas.openxmlformats.org/drawingml/2006/main" xmlns:r="http://schemas.openxmlformats.org/officeDocument/2006/relationships" xmlns:p="http://schemas.openxmlformats.org/presentationml/2006/main">
+  <p:cSld>
+    <p:spTree>
+      <p:nvGrpSpPr>
+        <p:cNvPr id="1" name=""/>
+        <p:cNvGrpSpPr/>
+        <p:nvPr/>
+      </p:nvGrpSpPr>
+      <p:grpSpPr>
+        <a:xfrm>
+          <a:off x="0" y="0"/>
+          <a:ext cx="0" cy="0"/>
+          <a:chOff x="0" y="0"/>
+          <a:chExt cx="0" cy="0"/>
+        </a:xfrm>
+      </p:grpSpPr>
+      <p:sp>
+        <p:nvSpPr>
+          <p:cNvPr id="4" name="Title 3"/>
+          <p:cNvSpPr>
+            <a:spLocks noGrp="1"/>
+          </p:cNvSpPr>
+          <p:nvPr>
+            <p:ph type="title"/>
+          </p:nvPr>
+        </p:nvSpPr>
+        <p:spPr/>
+        <p:txBody>
+          <a:bodyPr/>
+          <a:lstStyle/>
+          <a:p>
+            <a:r>
+              <a:rPr lang="th-TH" dirty="0" smtClean="0"/>
+              <a:t>วัตถุประสงค์ของโครงงาน</a:t>
+            </a:r>
+            <a:endParaRPr lang="en-US" dirty="0"/>
+          </a:p>
+        </p:txBody>
+      </p:sp>
+      <p:sp>
+        <p:nvSpPr>
+          <p:cNvPr id="5" name="Content Placeholder 4"/>
+          <p:cNvSpPr>
+            <a:spLocks noGrp="1"/>
+          </p:cNvSpPr>
+          <p:nvPr>
+            <p:ph idx="1"/>
+          </p:nvPr>
+        </p:nvSpPr>
+        <p:spPr/>
+        <p:txBody>
+          <a:bodyPr/>
+          <a:lstStyle/>
+          <a:p>
+            <a:r>
+              <a:rPr lang="th-TH" sz="4000" dirty="0" smtClean="0"/>
+              <a:t>เพื่อบันทึกเส้นทางที่ได้เคยไปมาแล้ว</a:t>
+            </a:r>
+          </a:p>
+          <a:p>
+            <a:r>
+              <a:rPr lang="th-TH" sz="4000" dirty="0" smtClean="0"/>
+              <a:t>สามารถบอกได้ว่าพิกัดนั้นๆคือ สถานที่อะไร</a:t>
+            </a:r>
+          </a:p>
+          <a:p>
+            <a:r>
+              <a:rPr lang="th-TH" sz="4000" dirty="0" smtClean="0"/>
+              <a:t>สามารถใช้ในทางการสำรวจพื้นที่ได้</a:t>
+            </a:r>
+          </a:p>
+          <a:p>
+            <a:r>
+              <a:rPr lang="th-TH" sz="4000" dirty="0" smtClean="0"/>
+              <a:t>เป็นประโยชน์ต่อการท่องเที่ยว และความรู้สึกหลังจากการท่องเที่ยว</a:t>
+            </a:r>
+          </a:p>
+          <a:p>
+            <a:endParaRPr lang="th-TH" dirty="0" smtClean="0"/>
+          </a:p>
+          <a:p>
+            <a:endParaRPr lang="en-US" dirty="0"/>
+          </a:p>
+        </p:txBody>
+      </p:sp>
+    </p:spTree>
+    <p:extLst>
+      <p:ext uri="{BB962C8B-B14F-4D97-AF65-F5344CB8AC3E}">
+        <p14:creationId xmlns:p14="http://schemas.microsoft.com/office/powerpoint/2010/main" val="1897534785"/>
+      </p:ext>
+    </p:extLst>
+  </p:cSld>
+  <p:clrMapOvr>
+    <a:masterClrMapping/>
+  </p:clrMapOvr>
+  <p:timing>
+    <p:tnLst>
+      <p:par>
+        <p:cTn id="1" dur="indefinite" restart="never" nodeType="tmRoot"/>
+      </p:par>
+    </p:tnLst>
+  </p:timing>
+</p:sld>
+</file>
+
+<file path=ppt/slides/slide4.xml><?xml version="1.0" encoding="utf-8"?>
+<p:sld xmlns:a="http://schemas.openxmlformats.org/drawingml/2006/main" xmlns:r="http://schemas.openxmlformats.org/officeDocument/2006/relationships" xmlns:p="http://schemas.openxmlformats.org/presentationml/2006/main">
+  <p:cSld>
+    <p:spTree>
+      <p:nvGrpSpPr>
+        <p:cNvPr id="1" name=""/>
+        <p:cNvGrpSpPr/>
+        <p:nvPr/>
+      </p:nvGrpSpPr>
+      <p:grpSpPr>
+        <a:xfrm>
+          <a:off x="0" y="0"/>
+          <a:ext cx="0" cy="0"/>
+          <a:chOff x="0" y="0"/>
+          <a:chExt cx="0" cy="0"/>
+        </a:xfrm>
+      </p:grpSpPr>
+      <p:sp>
+        <p:nvSpPr>
+          <p:cNvPr id="4" name="Title 3"/>
+          <p:cNvSpPr>
+            <a:spLocks noGrp="1"/>
+          </p:cNvSpPr>
+          <p:nvPr>
+            <p:ph type="title"/>
+          </p:nvPr>
+        </p:nvSpPr>
+        <p:spPr/>
+        <p:txBody>
+          <a:bodyPr/>
+          <a:lstStyle/>
+          <a:p>
+            <a:r>
+              <a:rPr lang="th-TH" dirty="0" smtClean="0"/>
+              <a:t>แตกต่างจากโปรแกรมอื่นๆอย่างไร</a:t>
+            </a:r>
+            <a:endParaRPr lang="en-US" dirty="0"/>
+          </a:p>
+        </p:txBody>
+      </p:sp>
+      <p:sp>
+        <p:nvSpPr>
+          <p:cNvPr id="5" name="Content Placeholder 4"/>
+          <p:cNvSpPr>
+            <a:spLocks noGrp="1"/>
+          </p:cNvSpPr>
+          <p:nvPr>
+            <p:ph idx="1"/>
+          </p:nvPr>
+        </p:nvSpPr>
+        <p:spPr/>
+        <p:txBody>
+          <a:bodyPr/>
+          <a:lstStyle/>
+          <a:p>
+            <a:pPr marL="0" indent="0">
+              <a:buNone/>
+            </a:pPr>
+            <a:endParaRPr lang="th-TH" dirty="0" smtClean="0"/>
+          </a:p>
+          <a:p>
+            <a:endParaRPr lang="en-US" dirty="0"/>
+          </a:p>
+        </p:txBody>
+      </p:sp>
+      <p:pic>
+        <p:nvPicPr>
+          <p:cNvPr id="1026" name="Picture 2" descr="C:\Users\JOeCole\Desktop\telenav-gps-navigator-on-android.jpg"/>
+          <p:cNvPicPr>
+            <a:picLocks noChangeAspect="1" noChangeArrowheads="1"/>
+          </p:cNvPicPr>
+          <p:nvPr/>
+        </p:nvPicPr>
+        <p:blipFill>
+          <a:blip r:embed="rId2">
+            <a:extLst>
+              <a:ext uri="{28A0092B-C50C-407E-A947-70E740481C1C}">
+                <a14:useLocalDpi xmlns:a14="http://schemas.microsoft.com/office/drawing/2010/main" val="0"/>
+              </a:ext>
+            </a:extLst>
+          </a:blip>
+          <a:srcRect/>
+          <a:stretch>
+            <a:fillRect/>
+          </a:stretch>
+        </p:blipFill>
+        <p:spPr bwMode="auto">
+          <a:xfrm>
+            <a:off x="2514600" y="1881613"/>
+            <a:ext cx="1324230" cy="2209800"/>
+          </a:xfrm>
+          <a:prstGeom prst="rect">
+            <a:avLst/>
+          </a:prstGeom>
+          <a:noFill/>
+          <a:extLst>
+            <a:ext uri="{909E8E84-426E-40DD-AFC4-6F175D3DCCD1}">
+              <a14:hiddenFill xmlns:a14="http://schemas.microsoft.com/office/drawing/2010/main">
+                <a:solidFill>
+                  <a:srgbClr val="FFFFFF"/>
+                </a:solidFill>
+              </a14:hiddenFill>
+            </a:ext>
+          </a:extLst>
+        </p:spPr>
+      </p:pic>
+      <p:pic>
+        <p:nvPicPr>
+          <p:cNvPr id="1027" name="Picture 3" descr="C:\Users\JOeCole\Desktop\image2.png"/>
+          <p:cNvPicPr>
+            <a:picLocks noChangeAspect="1" noChangeArrowheads="1"/>
+          </p:cNvPicPr>
+          <p:nvPr/>
+        </p:nvPicPr>
+        <p:blipFill>
+          <a:blip r:embed="rId3" cstate="print">
+            <a:extLst>
+              <a:ext uri="{28A0092B-C50C-407E-A947-70E740481C1C}">
+                <a14:useLocalDpi xmlns:a14="http://schemas.microsoft.com/office/drawing/2010/main" val="0"/>
+              </a:ext>
+            </a:extLst>
+          </a:blip>
+          <a:srcRect/>
+          <a:stretch>
+            <a:fillRect/>
+          </a:stretch>
+        </p:blipFill>
+        <p:spPr bwMode="auto">
+          <a:xfrm>
+            <a:off x="762000" y="3429000"/>
+            <a:ext cx="1331495" cy="2368952"/>
+          </a:xfrm>
+          <a:prstGeom prst="rect">
+            <a:avLst/>
+          </a:prstGeom>
+          <a:noFill/>
+          <a:extLst>
+            <a:ext uri="{909E8E84-426E-40DD-AFC4-6F175D3DCCD1}">
+              <a14:hiddenFill xmlns:a14="http://schemas.microsoft.com/office/drawing/2010/main">
+                <a:solidFill>
+                  <a:srgbClr val="FFFFFF"/>
+                </a:solidFill>
+              </a14:hiddenFill>
+            </a:ext>
+          </a:extLst>
+        </p:spPr>
+      </p:pic>
+      <p:pic>
+        <p:nvPicPr>
+          <p:cNvPr id="1029" name="Picture 5" descr="C:\Users\JOeCole\Desktop\TN-655531_NAVIGON_MobileNavigator_Android_MapView.png.jpg"/>
+          <p:cNvPicPr>
+            <a:picLocks noChangeAspect="1" noChangeArrowheads="1"/>
+          </p:cNvPicPr>
+          <p:nvPr/>
+        </p:nvPicPr>
+        <p:blipFill>
+          <a:blip r:embed="rId4">
+            <a:extLst>
+              <a:ext uri="{28A0092B-C50C-407E-A947-70E740481C1C}">
+                <a14:useLocalDpi xmlns:a14="http://schemas.microsoft.com/office/drawing/2010/main" val="0"/>
+              </a:ext>
+            </a:extLst>
+          </a:blip>
+          <a:srcRect/>
+          <a:stretch>
+            <a:fillRect/>
+          </a:stretch>
+        </p:blipFill>
+        <p:spPr bwMode="auto">
+          <a:xfrm>
+            <a:off x="7086600" y="2604198"/>
+            <a:ext cx="1447800" cy="2303318"/>
+          </a:xfrm>
+          <a:prstGeom prst="rect">
+            <a:avLst/>
+          </a:prstGeom>
+          <a:noFill/>
+          <a:extLst>
+            <a:ext uri="{909E8E84-426E-40DD-AFC4-6F175D3DCCD1}">
+              <a14:hiddenFill xmlns:a14="http://schemas.microsoft.com/office/drawing/2010/main">
+                <a:solidFill>
+                  <a:srgbClr val="FFFFFF"/>
+                </a:solidFill>
+              </a14:hiddenFill>
+            </a:ext>
+          </a:extLst>
+        </p:spPr>
+      </p:pic>
+      <p:pic>
+        <p:nvPicPr>
+          <p:cNvPr id="1030" name="Picture 6" descr="C:\Users\JOeCole\Desktop\telenav-gps-navigator-for-t-mobile-g1.jpg"/>
+          <p:cNvPicPr>
+            <a:picLocks noChangeAspect="1" noChangeArrowheads="1"/>
+          </p:cNvPicPr>
+          <p:nvPr/>
+        </p:nvPicPr>
+        <p:blipFill>
+          <a:blip r:embed="rId5">
+            <a:extLst>
+              <a:ext uri="{28A0092B-C50C-407E-A947-70E740481C1C}">
+                <a14:useLocalDpi xmlns:a14="http://schemas.microsoft.com/office/drawing/2010/main" val="0"/>
+              </a:ext>
+            </a:extLst>
+          </a:blip>
+          <a:srcRect/>
+          <a:stretch>
+            <a:fillRect/>
+          </a:stretch>
+        </p:blipFill>
+        <p:spPr bwMode="auto">
+          <a:xfrm>
+            <a:off x="4267200" y="2308692"/>
+            <a:ext cx="2222842" cy="3040063"/>
+          </a:xfrm>
+          <a:prstGeom prst="rect">
+            <a:avLst/>
+          </a:prstGeom>
+          <a:noFill/>
+          <a:extLst>
+            <a:ext uri="{909E8E84-426E-40DD-AFC4-6F175D3DCCD1}">
+              <a14:hiddenFill xmlns:a14="http://schemas.microsoft.com/office/drawing/2010/main">
+                <a:solidFill>
+                  <a:srgbClr val="FFFFFF"/>
+                </a:solidFill>
+              </a14:hiddenFill>
+            </a:ext>
+          </a:extLst>
+        </p:spPr>
+      </p:pic>
+    </p:spTree>
+    <p:extLst>
+      <p:ext uri="{BB962C8B-B14F-4D97-AF65-F5344CB8AC3E}">
+        <p14:creationId xmlns:p14="http://schemas.microsoft.com/office/powerpoint/2010/main" val="1312023503"/>
+      </p:ext>
+    </p:extLst>
+  </p:cSld>
+  <p:clrMapOvr>
+    <a:masterClrMapping/>
+  </p:clrMapOvr>
+  <p:timing>
+    <p:tnLst>
+      <p:par>
+        <p:cTn id="1" dur="indefinite" restart="never" nodeType="tmRoot"/>
+      </p:par>
+    </p:tnLst>
+  </p:timing>
+</p:sld>
+</file>
+
+<file path=ppt/slides/slide5.xml><?xml version="1.0" encoding="utf-8"?>
+<p:sld xmlns:a="http://schemas.openxmlformats.org/drawingml/2006/main" xmlns:r="http://schemas.openxmlformats.org/officeDocument/2006/relationships" xmlns:p="http://schemas.openxmlformats.org/presentationml/2006/main">
+  <p:cSld>
+    <p:spTree>
+      <p:nvGrpSpPr>
+        <p:cNvPr id="1" name=""/>
+        <p:cNvGrpSpPr/>
+        <p:nvPr/>
+      </p:nvGrpSpPr>
+      <p:grpSpPr>
+        <a:xfrm>
+          <a:off x="0" y="0"/>
+          <a:ext cx="0" cy="0"/>
+          <a:chOff x="0" y="0"/>
+          <a:chExt cx="0" cy="0"/>
+        </a:xfrm>
+      </p:grpSpPr>
+      <p:sp>
+        <p:nvSpPr>
+          <p:cNvPr id="2" name="Title 1"/>
+          <p:cNvSpPr>
+            <a:spLocks noGrp="1"/>
+          </p:cNvSpPr>
+          <p:nvPr>
+            <p:ph type="title"/>
+          </p:nvPr>
+        </p:nvSpPr>
+        <p:spPr/>
+        <p:txBody>
+          <a:bodyPr/>
+          <a:lstStyle/>
+          <a:p>
+            <a:r>
+              <a:rPr lang="th-TH" dirty="0" smtClean="0"/>
+              <a:t>ความสามารถของโปรแกรม</a:t>
+            </a:r>
+            <a:endParaRPr lang="en-US" dirty="0"/>
+          </a:p>
+        </p:txBody>
+      </p:sp>
+      <p:sp>
+        <p:nvSpPr>
+          <p:cNvPr id="3" name="Content Placeholder 2"/>
+          <p:cNvSpPr>
+            <a:spLocks noGrp="1"/>
+          </p:cNvSpPr>
+          <p:nvPr>
+            <p:ph idx="1"/>
+          </p:nvPr>
+        </p:nvSpPr>
+        <p:spPr/>
+        <p:txBody>
+          <a:bodyPr>
+            <a:normAutofit/>
+          </a:bodyPr>
+          <a:lstStyle/>
+          <a:p>
+            <a:r>
+              <a:rPr lang="th-TH" sz="4000" dirty="0" smtClean="0"/>
+              <a:t>จดจำเส้นทางที่ไปมาแล้วได้</a:t>
+            </a:r>
+          </a:p>
+          <a:p>
+            <a:r>
+              <a:rPr lang="th-TH" sz="4000" dirty="0" smtClean="0"/>
+              <a:t>สามารถติดป้ายชื่อ พิกัดนั้นๆ ว่าเป็นสถานที่อะไรได้</a:t>
+            </a:r>
+          </a:p>
+          <a:p>
+            <a:r>
+              <a:rPr lang="th-TH" sz="4000" dirty="0" smtClean="0"/>
+              <a:t>หยุดบันทึกชั่วคราว และกลับมาบันทึกต่อได้</a:t>
+            </a:r>
+          </a:p>
+          <a:p>
+            <a:r>
+              <a:rPr lang="th-TH" sz="4000" dirty="0" smtClean="0"/>
+              <a:t>สรุปข้อมูลการเดินทาง เวลาทั้งหมด ความเร็วเฉลี่ย อาจรวมถึง ระยะทาง ชื่อเส้นทางที่ผ่านมา </a:t>
+            </a:r>
+            <a:endParaRPr lang="en-US" sz="4000" dirty="0"/>
+          </a:p>
+        </p:txBody>
+      </p:sp>
+    </p:spTree>
+    <p:extLst>
+      <p:ext uri="{BB962C8B-B14F-4D97-AF65-F5344CB8AC3E}">
+        <p14:creationId xmlns:p14="http://schemas.microsoft.com/office/powerpoint/2010/main" val="1630400559"/>
+      </p:ext>
+    </p:extLst>
+  </p:cSld>
+  <p:clrMapOvr>
+    <a:masterClrMapping/>
+  </p:clrMapOvr>
+</p:sld>
+</file>
+
+<file path=ppt/slides/slide6.xml><?xml version="1.0" encoding="utf-8"?>
+<p:sld xmlns:a="http://schemas.openxmlformats.org/drawingml/2006/main" xmlns:r="http://schemas.openxmlformats.org/officeDocument/2006/relationships" xmlns:p="http://schemas.openxmlformats.org/presentationml/2006/main">
+  <p:cSld>
+    <p:spTree>
+      <p:nvGrpSpPr>
+        <p:cNvPr id="1" name=""/>
+        <p:cNvGrpSpPr/>
+        <p:nvPr/>
+      </p:nvGrpSpPr>
+      <p:grpSpPr>
+        <a:xfrm>
+          <a:off x="0" y="0"/>
+          <a:ext cx="0" cy="0"/>
+          <a:chOff x="0" y="0"/>
+          <a:chExt cx="0" cy="0"/>
+        </a:xfrm>
+      </p:grpSpPr>
+      <p:sp>
+        <p:nvSpPr>
+          <p:cNvPr id="2" name="Title 1"/>
+          <p:cNvSpPr>
+            <a:spLocks noGrp="1"/>
+          </p:cNvSpPr>
+          <p:nvPr>
+            <p:ph type="title"/>
+          </p:nvPr>
+        </p:nvSpPr>
+        <p:spPr/>
+        <p:txBody>
+          <a:bodyPr>
+            <a:normAutofit/>
+          </a:bodyPr>
+          <a:lstStyle/>
+          <a:p>
+            <a:r>
+              <a:rPr lang="th-TH" sz="6000" b="1" dirty="0" smtClean="0"/>
+              <a:t>หลักการทำงานของโปรแกรม</a:t>
+            </a:r>
+            <a:endParaRPr lang="en-US" sz="6000" b="1" dirty="0"/>
+          </a:p>
+        </p:txBody>
+      </p:sp>
+      <p:graphicFrame>
+        <p:nvGraphicFramePr>
+          <p:cNvPr id="4" name="Content Placeholder 3"/>
+          <p:cNvGraphicFramePr>
+            <a:graphicFrameLocks noGrp="1"/>
+          </p:cNvGraphicFramePr>
+          <p:nvPr>
+            <p:ph idx="1"/>
+            <p:extLst>
+              <p:ext uri="{D42A27DB-BD31-4B8C-83A1-F6EECF244321}">
+                <p14:modId xmlns:p14="http://schemas.microsoft.com/office/powerpoint/2010/main" val="2217264932"/>
+              </p:ext>
+            </p:extLst>
+          </p:nvPr>
+        </p:nvGraphicFramePr>
+        <p:xfrm>
+          <a:off x="3771900" y="1295400"/>
+          <a:ext cx="5067300" cy="4343400"/>
+        </p:xfrm>
+        <a:graphic>
+          <a:graphicData uri="http://schemas.openxmlformats.org/drawingml/2006/diagram">
+            <dgm:relIds xmlns:dgm="http://schemas.openxmlformats.org/drawingml/2006/diagram" xmlns:r="http://schemas.openxmlformats.org/officeDocument/2006/relationships" r:dm="rId2" r:lo="rId3" r:qs="rId4" r:cs="rId5"/>
+          </a:graphicData>
+        </a:graphic>
+      </p:graphicFrame>
+      <p:pic>
+        <p:nvPicPr>
+          <p:cNvPr id="5" name="Picture 4"/>
+          <p:cNvPicPr>
+            <a:picLocks noChangeAspect="1"/>
+          </p:cNvPicPr>
+          <p:nvPr/>
+        </p:nvPicPr>
+        <p:blipFill>
+          <a:blip r:embed="rId7" cstate="print">
+            <a:extLst>
+              <a:ext uri="{28A0092B-C50C-407E-A947-70E740481C1C}">
+                <a14:useLocalDpi xmlns:a14="http://schemas.microsoft.com/office/drawing/2010/main" val="0"/>
+              </a:ext>
+            </a:extLst>
+          </a:blip>
+          <a:stretch>
+            <a:fillRect/>
+          </a:stretch>
+        </p:blipFill>
+        <p:spPr>
+          <a:xfrm>
+            <a:off x="5638800" y="5410200"/>
+            <a:ext cx="1219200" cy="1219200"/>
+          </a:xfrm>
+          <a:prstGeom prst="rect">
+            <a:avLst/>
+          </a:prstGeom>
+        </p:spPr>
+      </p:pic>
+      <p:pic>
+        <p:nvPicPr>
+          <p:cNvPr id="1028" name="Picture 4" descr="C:\Users\JOeCole\AppData\Local\Microsoft\Windows\Temporary Internet Files\Content.IE5\99KOCIIL\MC900433922[1].png"/>
+          <p:cNvPicPr>
+            <a:picLocks noChangeAspect="1" noChangeArrowheads="1"/>
+          </p:cNvPicPr>
+          <p:nvPr/>
+        </p:nvPicPr>
+        <p:blipFill>
+          <a:blip r:embed="rId8" cstate="print">
+            <a:extLst>
+              <a:ext uri="{28A0092B-C50C-407E-A947-70E740481C1C}">
+                <a14:useLocalDpi xmlns:a14="http://schemas.microsoft.com/office/drawing/2010/main" val="0"/>
+              </a:ext>
+            </a:extLst>
+          </a:blip>
+          <a:srcRect/>
+          <a:stretch>
+            <a:fillRect/>
+          </a:stretch>
+        </p:blipFill>
+        <p:spPr bwMode="auto">
+          <a:xfrm flipH="1">
+            <a:off x="685800" y="1600200"/>
+            <a:ext cx="2057400" cy="2057400"/>
+          </a:xfrm>
+          <a:prstGeom prst="rect">
+            <a:avLst/>
+          </a:prstGeom>
+          <a:noFill/>
+          <a:extLst>
+            <a:ext uri="{909E8E84-426E-40DD-AFC4-6F175D3DCCD1}">
+              <a14:hiddenFill xmlns:a14="http://schemas.microsoft.com/office/drawing/2010/main">
+                <a:solidFill>
+                  <a:srgbClr val="FFFFFF"/>
+                </a:solidFill>
+              </a14:hiddenFill>
+            </a:ext>
+          </a:extLst>
+        </p:spPr>
+      </p:pic>
+      <p:cxnSp>
+        <p:nvCxnSpPr>
+          <p:cNvPr id="9" name="Straight Arrow Connector 8"/>
+          <p:cNvCxnSpPr/>
+          <p:nvPr/>
+        </p:nvCxnSpPr>
+        <p:spPr>
+          <a:xfrm>
+            <a:off x="2743200" y="2857500"/>
+            <a:ext cx="1981200" cy="495300"/>
+          </a:xfrm>
+          <a:prstGeom prst="straightConnector1">
+            <a:avLst/>
+          </a:prstGeom>
+          <a:ln>
+            <a:tailEnd type="arrow"/>
+          </a:ln>
+        </p:spPr>
+        <p:style>
+          <a:lnRef idx="3">
+            <a:schemeClr val="dk1"/>
+          </a:lnRef>
+          <a:fillRef idx="0">
+            <a:schemeClr val="dk1"/>
+          </a:fillRef>
+          <a:effectRef idx="2">
+            <a:schemeClr val="dk1"/>
+          </a:effectRef>
+          <a:fontRef idx="minor">
+            <a:schemeClr val="tx1"/>
+          </a:fontRef>
+        </p:style>
+      </p:cxnSp>
+    </p:spTree>
+    <p:extLst>
+      <p:ext uri="{BB962C8B-B14F-4D97-AF65-F5344CB8AC3E}">
+        <p14:creationId xmlns:p14="http://schemas.microsoft.com/office/powerpoint/2010/main" val="1015130875"/>
+      </p:ext>
+    </p:extLst>
+  </p:cSld>
+  <p:clrMapOvr>
+    <a:masterClrMapping/>
+  </p:clrMapOvr>
+  <p:timing>
+    <p:tnLst>
+      <p:par>
+        <p:cTn id="1" dur="indefinite" restart="never" nodeType="tmRoot"/>
+      </p:par>
+    </p:tnLst>
+  </p:timing>
+</p:sld>
+</file>
+
+<file path=ppt/slides/slide7.xml><?xml version="1.0" encoding="utf-8"?>
+<p:sld xmlns:a="http://schemas.openxmlformats.org/drawingml/2006/main" xmlns:r="http://schemas.openxmlformats.org/officeDocument/2006/relationships" xmlns:p="http://schemas.openxmlformats.org/presentationml/2006/main">
+  <p:cSld>
+    <p:bg>
+      <p:bgPr>
+        <a:solidFill>
+          <a:schemeClr val="bg1"/>
+        </a:solidFill>
+        <a:effectLst/>
+      </p:bgPr>
+    </p:bg>
+    <p:spTree>
+      <p:nvGrpSpPr>
+        <p:cNvPr id="1" name=""/>
+        <p:cNvGrpSpPr/>
+        <p:nvPr/>
+      </p:nvGrpSpPr>
+      <p:grpSpPr>
+        <a:xfrm>
+          <a:off x="0" y="0"/>
+          <a:ext cx="0" cy="0"/>
+          <a:chOff x="0" y="0"/>
+          <a:chExt cx="0" cy="0"/>
+        </a:xfrm>
+      </p:grpSpPr>
+      <p:pic>
+        <p:nvPicPr>
+          <p:cNvPr id="13" name="Picture 12"/>
+          <p:cNvPicPr>
+            <a:picLocks noChangeAspect="1"/>
+          </p:cNvPicPr>
+          <p:nvPr/>
+        </p:nvPicPr>
+        <p:blipFill rotWithShape="1">
+          <a:blip r:embed="rId3" cstate="print">
+            <a:extLst>
+              <a:ext uri="{28A0092B-C50C-407E-A947-70E740481C1C}">
+                <a14:useLocalDpi xmlns:a14="http://schemas.microsoft.com/office/drawing/2010/main" val="0"/>
+              </a:ext>
+            </a:extLst>
+          </a:blip>
+          <a:srcRect l="31468" t="5245" r="31818" b="5594"/>
+          <a:stretch/>
+        </p:blipFill>
+        <p:spPr bwMode="auto">
+          <a:xfrm>
+            <a:off x="5300579" y="1634808"/>
+            <a:ext cx="1786021" cy="3470592"/>
+          </a:xfrm>
+          <a:prstGeom prst="rect">
+            <a:avLst/>
+          </a:prstGeom>
+          <a:ln>
+            <a:noFill/>
+          </a:ln>
+          <a:extLst>
+            <a:ext uri="{53640926-AAD7-44D8-BBD7-CCE9431645EC}">
+              <a14:shadowObscured xmlns:a14="http://schemas.microsoft.com/office/drawing/2010/main"/>
+            </a:ext>
+          </a:extLst>
+        </p:spPr>
+      </p:pic>
+      <p:sp>
+        <p:nvSpPr>
+          <p:cNvPr id="14" name="Flowchart: Alternate Process 13"/>
+          <p:cNvSpPr/>
+          <p:nvPr/>
+        </p:nvSpPr>
+        <p:spPr>
+          <a:xfrm>
+            <a:off x="5606753" y="2587519"/>
+            <a:ext cx="1173223" cy="644947"/>
+          </a:xfrm>
+          <a:prstGeom prst="flowChartAlternateProcess">
+            <a:avLst/>
+          </a:prstGeom>
+        </p:spPr>
+        <p:style>
+          <a:lnRef idx="2">
+            <a:schemeClr val="accent1">
+              <a:shade val="50000"/>
+            </a:schemeClr>
+          </a:lnRef>
+          <a:fillRef idx="1">
+            <a:schemeClr val="accent1"/>
+          </a:fillRef>
+          <a:effectRef idx="0">
+            <a:schemeClr val="accent1"/>
+          </a:effectRef>
+          <a:fontRef idx="minor">
+            <a:schemeClr val="lt1"/>
+          </a:fontRef>
+        </p:style>
+        <p:txBody>
+          <a:bodyPr rot="0" spcFirstLastPara="0" vert="horz" wrap="square" lIns="91440" tIns="45720" rIns="91440" bIns="45720" numCol="1" spcCol="0" rtlCol="0" fromWordArt="0" anchor="ctr" anchorCtr="0" forceAA="0" compatLnSpc="1">
+            <a:prstTxWarp prst="textNoShape">
+              <a:avLst/>
+            </a:prstTxWarp>
+            <a:noAutofit/>
+          </a:bodyPr>
+          <a:lstStyle/>
+          <a:p>
+            <a:pPr marL="0" marR="0" algn="ctr">
+              <a:lnSpc>
+                <a:spcPct val="115000"/>
+              </a:lnSpc>
+              <a:spcBef>
+                <a:spcPts val="0"/>
+              </a:spcBef>
+              <a:spcAft>
+                <a:spcPts val="1000"/>
+              </a:spcAft>
+            </a:pPr>
+            <a:r>
+              <a:rPr lang="en-US" sz="2800" b="1" dirty="0">
+                <a:effectLst/>
+                <a:ea typeface="Calibri"/>
+                <a:cs typeface="Cordia New"/>
+              </a:rPr>
+              <a:t>Start</a:t>
+            </a:r>
+            <a:endParaRPr lang="en-US" sz="2800" dirty="0">
+              <a:effectLst/>
+              <a:ea typeface="Calibri"/>
+              <a:cs typeface="Cordia New"/>
+            </a:endParaRPr>
+          </a:p>
+        </p:txBody>
+      </p:sp>
+      <p:sp>
+        <p:nvSpPr>
+          <p:cNvPr id="12" name="Pentagon 11"/>
+          <p:cNvSpPr/>
+          <p:nvPr/>
+        </p:nvSpPr>
+        <p:spPr>
+          <a:xfrm>
+            <a:off x="1371600" y="1922383"/>
+            <a:ext cx="3510519" cy="2620165"/>
+          </a:xfrm>
+          <a:prstGeom prst="homePlate">
+            <a:avLst/>
+          </a:prstGeom>
+        </p:spPr>
+        <p:style>
+          <a:lnRef idx="2">
+            <a:schemeClr val="accent1"/>
+          </a:lnRef>
+          <a:fillRef idx="1">
+            <a:schemeClr val="lt1"/>
+          </a:fillRef>
+          <a:effectRef idx="0">
+            <a:schemeClr val="accent1"/>
+          </a:effectRef>
+          <a:fontRef idx="minor">
+            <a:schemeClr val="dk1"/>
+          </a:fontRef>
+        </p:style>
+        <p:txBody>
+          <a:bodyPr rot="0" spcFirstLastPara="0" vert="horz" wrap="square" lIns="91440" tIns="45720" rIns="91440" bIns="45720" numCol="1" spcCol="0" rtlCol="0" fromWordArt="0" anchor="ctr" anchorCtr="0" forceAA="0" compatLnSpc="1">
+            <a:prstTxWarp prst="textNoShape">
+              <a:avLst/>
+            </a:prstTxWarp>
+            <a:noAutofit/>
+          </a:bodyPr>
+          <a:lstStyle/>
+          <a:p>
+            <a:pPr marL="0" marR="0">
+              <a:lnSpc>
+                <a:spcPct val="115000"/>
+              </a:lnSpc>
+              <a:spcBef>
+                <a:spcPts val="0"/>
+              </a:spcBef>
+              <a:spcAft>
+                <a:spcPts val="0"/>
+              </a:spcAft>
+            </a:pPr>
+            <a:r>
+              <a:rPr lang="en-US" sz="3200" dirty="0">
+                <a:effectLst/>
+                <a:ea typeface="Calibri"/>
+                <a:cs typeface="Cordia New"/>
+              </a:rPr>
+              <a:t>Turn on GPS </a:t>
+            </a:r>
+          </a:p>
+          <a:p>
+            <a:pPr marL="0" marR="0">
+              <a:lnSpc>
+                <a:spcPct val="115000"/>
+              </a:lnSpc>
+              <a:spcBef>
+                <a:spcPts val="0"/>
+              </a:spcBef>
+              <a:spcAft>
+                <a:spcPts val="0"/>
+              </a:spcAft>
+            </a:pPr>
+            <a:r>
+              <a:rPr lang="en-US" sz="3200" dirty="0">
+                <a:effectLst/>
+                <a:ea typeface="Calibri"/>
+                <a:cs typeface="Cordia New"/>
+              </a:rPr>
+              <a:t>and</a:t>
+            </a:r>
+          </a:p>
+          <a:p>
+            <a:pPr marL="0" marR="0">
+              <a:lnSpc>
+                <a:spcPct val="115000"/>
+              </a:lnSpc>
+              <a:spcBef>
+                <a:spcPts val="0"/>
+              </a:spcBef>
+              <a:spcAft>
+                <a:spcPts val="0"/>
+              </a:spcAft>
+            </a:pPr>
+            <a:r>
+              <a:rPr lang="en-US" sz="3200" dirty="0">
+                <a:effectLst/>
+                <a:ea typeface="Calibri"/>
+                <a:cs typeface="Cordia New"/>
+              </a:rPr>
+              <a:t>run program</a:t>
+            </a:r>
+          </a:p>
+        </p:txBody>
+      </p:sp>
+    </p:spTree>
+    <p:extLst>
+      <p:ext uri="{BB962C8B-B14F-4D97-AF65-F5344CB8AC3E}">
+        <p14:creationId xmlns:p14="http://schemas.microsoft.com/office/powerpoint/2010/main" val="315046874"/>
+      </p:ext>
+    </p:extLst>
+  </p:cSld>
+  <p:clrMapOvr>
+    <a:masterClrMapping/>
+  </p:clrMapOvr>
+  <p:timing>
+    <p:tnLst>
+      <p:par>
+        <p:cTn id="1" dur="indefinite" restart="never" nodeType="tmRoot">
+          <p:childTnLst>
+            <p:seq concurrent="1" nextAc="seek">
+              <p:cTn id="2" dur="indefinite" nodeType="mainSeq">
+                <p:childTnLst>
+                  <p:par>
+                    <p:cTn id="3" fill="hold">
+                      <p:stCondLst>
+                        <p:cond delay="indefinite"/>
+                      </p:stCondLst>
+                      <p:childTnLst>
+                        <p:par>
+                          <p:cTn id="4" fill="hold">
+                            <p:stCondLst>
+                              <p:cond delay="0"/>
+                            </p:stCondLst>
+                            <p:childTnLst>
+                              <p:par>
+                                <p:cTn id="5" presetID="10" presetClass="entr" presetSubtype="0" fill="hold" grpId="0" nodeType="clickEffect">
+                                  <p:stCondLst>
+                                    <p:cond delay="0"/>
+                                  </p:stCondLst>
+                                  <p:childTnLst>
+                                    <p:set>
+                                      <p:cBhvr>
+                                        <p:cTn id="6" dur="1" fill="hold">
+                                          <p:stCondLst>
+                                            <p:cond delay="0"/>
+                                          </p:stCondLst>
+                                        </p:cTn>
+                                        <p:tgtEl>
+                                          <p:spTgt spid="12"/>
+                                        </p:tgtEl>
+                                        <p:attrNameLst>
+                                          <p:attrName>style.visibility</p:attrName>
+                                        </p:attrNameLst>
+                                      </p:cBhvr>
+                                      <p:to>
+                                        <p:strVal val="visible"/>
+                                      </p:to>
+                                    </p:set>
+                                    <p:animEffect transition="in" filter="fade">
+                                      <p:cBhvr>
+                                        <p:cTn id="7" dur="500"/>
+                                        <p:tgtEl>
+                                          <p:spTgt spid="12"/>
+                                        </p:tgtEl>
+                                      </p:cBhvr>
+                                    </p:animEffect>
+                                  </p:childTnLst>
+                                </p:cTn>
+                              </p:par>
+                              <p:par>
+                                <p:cTn id="8" presetID="10" presetClass="entr" presetSubtype="0" fill="hold" grpId="0" nodeType="withEffect">
+                                  <p:stCondLst>
+                                    <p:cond delay="0"/>
+                                  </p:stCondLst>
+                                  <p:childTnLst>
+                                    <p:set>
+                                      <p:cBhvr>
+                                        <p:cTn id="9" dur="1" fill="hold">
+                                          <p:stCondLst>
+                                            <p:cond delay="0"/>
+                                          </p:stCondLst>
+                                        </p:cTn>
+                                        <p:tgtEl>
+                                          <p:spTgt spid="14"/>
+                                        </p:tgtEl>
+                                        <p:attrNameLst>
+                                          <p:attrName>style.visibility</p:attrName>
+                                        </p:attrNameLst>
+                                      </p:cBhvr>
+                                      <p:to>
+                                        <p:strVal val="visible"/>
+                                      </p:to>
+                                    </p:set>
+                                    <p:animEffect transition="in" filter="fade">
+                                      <p:cBhvr>
+                                        <p:cTn id="10" dur="500"/>
+                                        <p:tgtEl>
+                                          <p:spTgt spid="14"/>
+                                        </p:tgtEl>
+                                      </p:cBhvr>
+                                    </p:animEffect>
+                                  </p:childTnLst>
+                                </p:cTn>
+                              </p:par>
+                            </p:childTnLst>
+                          </p:cTn>
+                        </p:par>
+                      </p:childTnLst>
+                    </p:cTn>
+                  </p:par>
+                </p:childTnLst>
+              </p:cTn>
+              <p:prevCondLst>
+                <p:cond evt="onPrev" delay="0">
+                  <p:tgtEl>
+                    <p:sldTgt/>
+                  </p:tgtEl>
+                </p:cond>
+              </p:prevCondLst>
+              <p:nextCondLst>
+                <p:cond evt="onNext" delay="0">
+                  <p:tgtEl>
+                    <p:sldTgt/>
+                  </p:tgtEl>
+                </p:cond>
+              </p:nextCondLst>
+            </p:seq>
+          </p:childTnLst>
+        </p:cTn>
+      </p:par>
+    </p:tnLst>
+    <p:bldLst>
+      <p:bldP spid="14" grpId="0" animBg="1"/>
+      <p:bldP spid="12" grpId="0" animBg="1"/>
+    </p:bldLst>
+  </p:timing>
+</p:sld>
+</file>
+
+<file path=ppt/slides/slide8.xml><?xml version="1.0" encoding="utf-8"?>
+<p:sld xmlns:a="http://schemas.openxmlformats.org/drawingml/2006/main" xmlns:r="http://schemas.openxmlformats.org/officeDocument/2006/relationships" xmlns:p="http://schemas.openxmlformats.org/presentationml/2006/main">
+  <p:cSld>
+    <p:bg>
+      <p:bgPr>
+        <a:solidFill>
+          <a:schemeClr val="bg1"/>
+        </a:solidFill>
+        <a:effectLst/>
+      </p:bgPr>
+    </p:bg>
+    <p:spTree>
+      <p:nvGrpSpPr>
+        <p:cNvPr id="1" name=""/>
+        <p:cNvGrpSpPr/>
+        <p:nvPr/>
+      </p:nvGrpSpPr>
+      <p:grpSpPr>
+        <a:xfrm>
+          <a:off x="0" y="0"/>
+          <a:ext cx="0" cy="0"/>
+          <a:chOff x="0" y="0"/>
+          <a:chExt cx="0" cy="0"/>
+        </a:xfrm>
+      </p:grpSpPr>
+      <p:pic>
+        <p:nvPicPr>
+          <p:cNvPr id="13" name="Picture 12"/>
+          <p:cNvPicPr>
+            <a:picLocks noChangeAspect="1"/>
+          </p:cNvPicPr>
+          <p:nvPr/>
+        </p:nvPicPr>
+        <p:blipFill rotWithShape="1">
+          <a:blip r:embed="rId3" cstate="print">
+            <a:extLst>
+              <a:ext uri="{28A0092B-C50C-407E-A947-70E740481C1C}">
+                <a14:useLocalDpi xmlns:a14="http://schemas.microsoft.com/office/drawing/2010/main" val="0"/>
+              </a:ext>
+            </a:extLst>
+          </a:blip>
+          <a:srcRect l="31468" t="5245" r="31818" b="5594"/>
+          <a:stretch/>
+        </p:blipFill>
+        <p:spPr bwMode="auto">
+          <a:xfrm>
+            <a:off x="5300579" y="1634808"/>
+            <a:ext cx="1786021" cy="3470592"/>
+          </a:xfrm>
+          <a:prstGeom prst="rect">
+            <a:avLst/>
+          </a:prstGeom>
+          <a:ln>
+            <a:noFill/>
+          </a:ln>
+          <a:extLst>
+            <a:ext uri="{53640926-AAD7-44D8-BBD7-CCE9431645EC}">
+              <a14:shadowObscured xmlns:a14="http://schemas.microsoft.com/office/drawing/2010/main"/>
+            </a:ext>
+          </a:extLst>
+        </p:spPr>
+      </p:pic>
+      <p:sp>
+        <p:nvSpPr>
+          <p:cNvPr id="14" name="Flowchart: Alternate Process 13"/>
+          <p:cNvSpPr/>
+          <p:nvPr/>
+        </p:nvSpPr>
+        <p:spPr>
+          <a:xfrm>
+            <a:off x="5606753" y="2536902"/>
+            <a:ext cx="1173223" cy="644947"/>
+          </a:xfrm>
+          <a:prstGeom prst="flowChartAlternateProcess">
+            <a:avLst/>
+          </a:prstGeom>
+        </p:spPr>
+        <p:style>
+          <a:lnRef idx="2">
+            <a:schemeClr val="accent1">
+              <a:shade val="50000"/>
+            </a:schemeClr>
+          </a:lnRef>
+          <a:fillRef idx="1">
+            <a:schemeClr val="accent1"/>
+          </a:fillRef>
+          <a:effectRef idx="0">
+            <a:schemeClr val="accent1"/>
+          </a:effectRef>
+          <a:fontRef idx="minor">
+            <a:schemeClr val="lt1"/>
+          </a:fontRef>
+        </p:style>
+        <p:txBody>
+          <a:bodyPr rot="0" spcFirstLastPara="0" vert="horz" wrap="square" lIns="91440" tIns="45720" rIns="91440" bIns="45720" numCol="1" spcCol="0" rtlCol="0" fromWordArt="0" anchor="ctr" anchorCtr="0" forceAA="0" compatLnSpc="1">
+            <a:prstTxWarp prst="textNoShape">
+              <a:avLst/>
+            </a:prstTxWarp>
+            <a:noAutofit/>
+          </a:bodyPr>
+          <a:lstStyle/>
+          <a:p>
+            <a:pPr marL="0" marR="0" algn="ctr">
+              <a:lnSpc>
+                <a:spcPct val="115000"/>
+              </a:lnSpc>
+              <a:spcBef>
+                <a:spcPts val="0"/>
+              </a:spcBef>
+              <a:spcAft>
+                <a:spcPts val="1000"/>
+              </a:spcAft>
+            </a:pPr>
+            <a:r>
+              <a:rPr lang="en-US" sz="2800" b="1" dirty="0" smtClean="0">
+                <a:ea typeface="Calibri"/>
+                <a:cs typeface="Cordia New"/>
+              </a:rPr>
+              <a:t>Pause</a:t>
+            </a:r>
+            <a:endParaRPr lang="en-US" sz="2800" dirty="0">
+              <a:effectLst/>
+              <a:ea typeface="Calibri"/>
+              <a:cs typeface="Cordia New"/>
+            </a:endParaRPr>
+          </a:p>
+        </p:txBody>
+      </p:sp>
+      <p:sp>
+        <p:nvSpPr>
+          <p:cNvPr id="12" name="Pentagon 11"/>
+          <p:cNvSpPr/>
+          <p:nvPr/>
+        </p:nvSpPr>
+        <p:spPr>
+          <a:xfrm>
+            <a:off x="1371600" y="1922383"/>
+            <a:ext cx="3510519" cy="2620165"/>
+          </a:xfrm>
+          <a:prstGeom prst="homePlate">
+            <a:avLst/>
+          </a:prstGeom>
+        </p:spPr>
+        <p:style>
+          <a:lnRef idx="2">
+            <a:schemeClr val="accent1"/>
+          </a:lnRef>
+          <a:fillRef idx="1">
+            <a:schemeClr val="lt1"/>
+          </a:fillRef>
+          <a:effectRef idx="0">
+            <a:schemeClr val="accent1"/>
+          </a:effectRef>
+          <a:fontRef idx="minor">
+            <a:schemeClr val="dk1"/>
+          </a:fontRef>
+        </p:style>
+        <p:txBody>
+          <a:bodyPr rot="0" spcFirstLastPara="0" vert="horz" wrap="square" lIns="91440" tIns="45720" rIns="91440" bIns="45720" numCol="1" spcCol="0" rtlCol="0" fromWordArt="0" anchor="ctr" anchorCtr="0" forceAA="0" compatLnSpc="1">
+            <a:prstTxWarp prst="textNoShape">
+              <a:avLst/>
+            </a:prstTxWarp>
+            <a:noAutofit/>
+          </a:bodyPr>
+          <a:lstStyle/>
+          <a:p>
+            <a:r>
+              <a:rPr lang="en-US" sz="3200" dirty="0"/>
+              <a:t>Insert latitude</a:t>
+            </a:r>
+          </a:p>
+          <a:p>
+            <a:r>
+              <a:rPr lang="en-US" sz="3200" dirty="0"/>
+              <a:t>and longitude</a:t>
+            </a:r>
+          </a:p>
+          <a:p>
+            <a:r>
+              <a:rPr lang="en-US" sz="3200" dirty="0"/>
+              <a:t>into database</a:t>
+            </a:r>
+          </a:p>
+        </p:txBody>
+      </p:sp>
+      <p:sp>
+        <p:nvSpPr>
+          <p:cNvPr id="5" name="Flowchart: Alternate Process 4"/>
+          <p:cNvSpPr/>
+          <p:nvPr/>
+        </p:nvSpPr>
+        <p:spPr>
+          <a:xfrm>
+            <a:off x="5608577" y="3319487"/>
+            <a:ext cx="1173223" cy="644947"/>
+          </a:xfrm>
+          <a:prstGeom prst="flowChartAlternateProcess">
+            <a:avLst/>
+          </a:prstGeom>
+        </p:spPr>
+        <p:style>
+          <a:lnRef idx="2">
+            <a:schemeClr val="accent1">
+              <a:shade val="50000"/>
+            </a:schemeClr>
+          </a:lnRef>
+          <a:fillRef idx="1">
+            <a:schemeClr val="accent1"/>
+          </a:fillRef>
+          <a:effectRef idx="0">
+            <a:schemeClr val="accent1"/>
+          </a:effectRef>
+          <a:fontRef idx="minor">
+            <a:schemeClr val="lt1"/>
+          </a:fontRef>
+        </p:style>
+        <p:txBody>
+          <a:bodyPr rot="0" spcFirstLastPara="0" vert="horz" wrap="square" lIns="91440" tIns="45720" rIns="91440" bIns="45720" numCol="1" spcCol="0" rtlCol="0" fromWordArt="0" anchor="ctr" anchorCtr="0" forceAA="0" compatLnSpc="1">
+            <a:prstTxWarp prst="textNoShape">
+              <a:avLst/>
+            </a:prstTxWarp>
+            <a:noAutofit/>
+          </a:bodyPr>
+          <a:lstStyle/>
+          <a:p>
+            <a:pPr marL="0" marR="0" algn="ctr">
+              <a:lnSpc>
+                <a:spcPct val="115000"/>
+              </a:lnSpc>
+              <a:spcBef>
+                <a:spcPts val="0"/>
+              </a:spcBef>
+              <a:spcAft>
+                <a:spcPts val="1000"/>
+              </a:spcAft>
+            </a:pPr>
+            <a:r>
+              <a:rPr lang="en-US" sz="2800" b="1" dirty="0" smtClean="0">
+                <a:effectLst/>
+                <a:ea typeface="Calibri"/>
+                <a:cs typeface="Cordia New"/>
+              </a:rPr>
+              <a:t>Stop</a:t>
+            </a:r>
+            <a:endParaRPr lang="en-US" sz="2800" dirty="0">
+              <a:effectLst/>
+              <a:ea typeface="Calibri"/>
+              <a:cs typeface="Cordia New"/>
+            </a:endParaRPr>
+          </a:p>
+        </p:txBody>
+      </p:sp>
+    </p:spTree>
+    <p:extLst>
+      <p:ext uri="{BB962C8B-B14F-4D97-AF65-F5344CB8AC3E}">
+        <p14:creationId xmlns:p14="http://schemas.microsoft.com/office/powerpoint/2010/main" val="1498823684"/>
+      </p:ext>
+    </p:extLst>
+  </p:cSld>
+  <p:clrMapOvr>
+    <a:masterClrMapping/>
+  </p:clrMapOvr>
+  <p:timing>
+    <p:tnLst>
+      <p:par>
+        <p:cTn id="1" dur="indefinite" restart="never" nodeType="tmRoot">
+          <p:childTnLst>
+            <p:seq concurrent="1" nextAc="seek">
+              <p:cTn id="2" dur="indefinite" nodeType="mainSeq">
+                <p:childTnLst>
+                  <p:par>
+                    <p:cTn id="3" fill="hold">
+                      <p:stCondLst>
+                        <p:cond delay="indefinite"/>
+                      </p:stCondLst>
+                      <p:childTnLst>
+                        <p:par>
+                          <p:cTn id="4" fill="hold">
+                            <p:stCondLst>
+                              <p:cond delay="0"/>
+                            </p:stCondLst>
+                            <p:childTnLst>
+                              <p:par>
+                                <p:cTn id="5" presetID="10" presetClass="entr" presetSubtype="0" fill="hold" grpId="0" nodeType="clickEffect">
+                                  <p:stCondLst>
+                                    <p:cond delay="0"/>
+                                  </p:stCondLst>
+                                  <p:childTnLst>
+                                    <p:set>
+                                      <p:cBhvr>
+                                        <p:cTn id="6" dur="1" fill="hold">
+                                          <p:stCondLst>
+                                            <p:cond delay="0"/>
+                                          </p:stCondLst>
+                                        </p:cTn>
+                                        <p:tgtEl>
+                                          <p:spTgt spid="12"/>
+                                        </p:tgtEl>
+                                        <p:attrNameLst>
+                                          <p:attrName>style.visibility</p:attrName>
+                                        </p:attrNameLst>
+                                      </p:cBhvr>
+                                      <p:to>
+                                        <p:strVal val="visible"/>
+                                      </p:to>
+                                    </p:set>
+                                    <p:animEffect transition="in" filter="fade">
+                                      <p:cBhvr>
+                                        <p:cTn id="7" dur="500"/>
+                                        <p:tgtEl>
+                                          <p:spTgt spid="12"/>
+                                        </p:tgtEl>
+                                      </p:cBhvr>
+                                    </p:animEffect>
+                                  </p:childTnLst>
+                                </p:cTn>
+                              </p:par>
+                              <p:par>
+                                <p:cTn id="8" presetID="10" presetClass="entr" presetSubtype="0" fill="hold" grpId="0" nodeType="withEffect">
+                                  <p:stCondLst>
+                                    <p:cond delay="0"/>
+                                  </p:stCondLst>
+                                  <p:childTnLst>
+                                    <p:set>
+                                      <p:cBhvr>
+                                        <p:cTn id="9" dur="1" fill="hold">
+                                          <p:stCondLst>
+                                            <p:cond delay="0"/>
+                                          </p:stCondLst>
+                                        </p:cTn>
+                                        <p:tgtEl>
+                                          <p:spTgt spid="14"/>
+                                        </p:tgtEl>
+                                        <p:attrNameLst>
+                                          <p:attrName>style.visibility</p:attrName>
+                                        </p:attrNameLst>
+                                      </p:cBhvr>
+                                      <p:to>
+                                        <p:strVal val="visible"/>
+                                      </p:to>
+                                    </p:set>
+                                    <p:animEffect transition="in" filter="fade">
+                                      <p:cBhvr>
+                                        <p:cTn id="10" dur="500"/>
+                                        <p:tgtEl>
+                                          <p:spTgt spid="14"/>
+                                        </p:tgtEl>
+                                      </p:cBhvr>
+                                    </p:animEffect>
+                                  </p:childTnLst>
+                                </p:cTn>
+                              </p:par>
+                              <p:par>
+                                <p:cTn id="11" presetID="10" presetClass="entr" presetSubtype="0" fill="hold" grpId="0" nodeType="withEffect">
+                                  <p:stCondLst>
+                                    <p:cond delay="0"/>
+                                  </p:stCondLst>
+                                  <p:childTnLst>
+                                    <p:set>
+                                      <p:cBhvr>
+                                        <p:cTn id="12" dur="1" fill="hold">
+                                          <p:stCondLst>
+                                            <p:cond delay="0"/>
+                                          </p:stCondLst>
+                                        </p:cTn>
+                                        <p:tgtEl>
+                                          <p:spTgt spid="5"/>
+                                        </p:tgtEl>
+                                        <p:attrNameLst>
+                                          <p:attrName>style.visibility</p:attrName>
+                                        </p:attrNameLst>
+                                      </p:cBhvr>
+                                      <p:to>
+                                        <p:strVal val="visible"/>
+                                      </p:to>
+                                    </p:set>
+                                    <p:animEffect transition="in" filter="fade">
+                                      <p:cBhvr>
+                                        <p:cTn id="13" dur="500"/>
+                                        <p:tgtEl>
+                                          <p:spTgt spid="5"/>
+                                        </p:tgtEl>
+                                      </p:cBhvr>
+                                    </p:animEffect>
+                                  </p:childTnLst>
+                                </p:cTn>
+                              </p:par>
+                            </p:childTnLst>
+                          </p:cTn>
+                        </p:par>
+                      </p:childTnLst>
+                    </p:cTn>
+                  </p:par>
+                </p:childTnLst>
+              </p:cTn>
+              <p:prevCondLst>
+                <p:cond evt="onPrev" delay="0">
+                  <p:tgtEl>
+                    <p:sldTgt/>
+                  </p:tgtEl>
+                </p:cond>
+              </p:prevCondLst>
+              <p:nextCondLst>
+                <p:cond evt="onNext" delay="0">
+                  <p:tgtEl>
+                    <p:sldTgt/>
+                  </p:tgtEl>
+                </p:cond>
+              </p:nextCondLst>
+            </p:seq>
+          </p:childTnLst>
+        </p:cTn>
+      </p:par>
+    </p:tnLst>
+    <p:bldLst>
+      <p:bldP spid="14" grpId="0" animBg="1"/>
+      <p:bldP spid="12" grpId="0" animBg="1"/>
+      <p:bldP spid="5" grpId="0" animBg="1"/>
+    </p:bldLst>
+  </p:timing>
+</p:sld>
+</file>
+
+<file path=ppt/slides/slide9.xml><?xml version="1.0" encoding="utf-8"?>
+<p:sld xmlns:a="http://schemas.openxmlformats.org/drawingml/2006/main" xmlns:r="http://schemas.openxmlformats.org/officeDocument/2006/relationships" xmlns:p="http://schemas.openxmlformats.org/presentationml/2006/main">
+  <p:cSld>
+    <p:bg>
+      <p:bgPr>
+        <a:solidFill>
+          <a:schemeClr val="bg1"/>
+        </a:solidFill>
+        <a:effectLst/>
+      </p:bgPr>
+    </p:bg>
+    <p:spTree>
+      <p:nvGrpSpPr>
+        <p:cNvPr id="1" name=""/>
+        <p:cNvGrpSpPr/>
+        <p:nvPr/>
+      </p:nvGrpSpPr>
+      <p:grpSpPr>
+        <a:xfrm>
+          <a:off x="0" y="0"/>
+          <a:ext cx="0" cy="0"/>
+          <a:chOff x="0" y="0"/>
+          <a:chExt cx="0" cy="0"/>
+        </a:xfrm>
+      </p:grpSpPr>
+      <p:pic>
+        <p:nvPicPr>
+          <p:cNvPr id="4" name="Picture 3"/>
+          <p:cNvPicPr>
+            <a:picLocks noChangeAspect="1"/>
+          </p:cNvPicPr>
+          <p:nvPr/>
+        </p:nvPicPr>
+        <p:blipFill rotWithShape="1">
+          <a:blip r:embed="rId2" cstate="print">
+            <a:extLst>
+              <a:ext uri="{28A0092B-C50C-407E-A947-70E740481C1C}">
+                <a14:useLocalDpi xmlns:a14="http://schemas.microsoft.com/office/drawing/2010/main" val="0"/>
+              </a:ext>
+            </a:extLst>
+          </a:blip>
+          <a:srcRect l="31468" t="5245" r="31818" b="5594"/>
+          <a:stretch/>
+        </p:blipFill>
+        <p:spPr bwMode="auto">
+          <a:xfrm>
+            <a:off x="5300579" y="1634808"/>
+            <a:ext cx="1786021" cy="3470592"/>
+          </a:xfrm>
+          <a:prstGeom prst="rect">
+            <a:avLst/>
+          </a:prstGeom>
+          <a:ln>
+            <a:noFill/>
+          </a:ln>
+          <a:extLst>
+            <a:ext uri="{53640926-AAD7-44D8-BBD7-CCE9431645EC}">
+              <a14:shadowObscured xmlns:a14="http://schemas.microsoft.com/office/drawing/2010/main"/>
+            </a:ext>
+          </a:extLst>
+        </p:spPr>
+      </p:pic>
+      <p:sp>
+        <p:nvSpPr>
+          <p:cNvPr id="5" name="Flowchart: Alternate Process 4"/>
+          <p:cNvSpPr/>
+          <p:nvPr/>
+        </p:nvSpPr>
+        <p:spPr>
+          <a:xfrm>
+            <a:off x="5606977" y="2744360"/>
+            <a:ext cx="1173223" cy="976209"/>
+          </a:xfrm>
+          <a:prstGeom prst="flowChartAlternateProcess">
+            <a:avLst/>
+          </a:prstGeom>
+        </p:spPr>
+        <p:style>
+          <a:lnRef idx="2">
+            <a:schemeClr val="accent1">
+              <a:shade val="50000"/>
+            </a:schemeClr>
+          </a:lnRef>
+          <a:fillRef idx="1">
+            <a:schemeClr val="accent1"/>
+          </a:fillRef>
+          <a:effectRef idx="0">
+            <a:schemeClr val="accent1"/>
+          </a:effectRef>
+          <a:fontRef idx="minor">
+            <a:schemeClr val="lt1"/>
+          </a:fontRef>
+        </p:style>
+        <p:txBody>
+          <a:bodyPr rot="0" spcFirstLastPara="0" vert="horz" wrap="square" lIns="91440" tIns="45720" rIns="91440" bIns="45720" numCol="1" spcCol="0" rtlCol="0" fromWordArt="0" anchor="ctr" anchorCtr="0" forceAA="0" compatLnSpc="1">
+            <a:prstTxWarp prst="textNoShape">
+              <a:avLst/>
+            </a:prstTxWarp>
+            <a:noAutofit/>
+          </a:bodyPr>
+          <a:lstStyle/>
+          <a:p>
+            <a:pPr marL="0" marR="0" algn="ctr">
+              <a:spcBef>
+                <a:spcPts val="0"/>
+              </a:spcBef>
+              <a:spcAft>
+                <a:spcPts val="1000"/>
+              </a:spcAft>
+            </a:pPr>
+            <a:r>
+              <a:rPr lang="en-US" sz="2800" b="1" dirty="0" smtClean="0">
+                <a:ea typeface="Calibri"/>
+                <a:cs typeface="Cordia New"/>
+              </a:rPr>
+              <a:t>Continue</a:t>
+            </a:r>
+            <a:endParaRPr lang="en-US" sz="2800" dirty="0">
+              <a:effectLst/>
+              <a:ea typeface="Calibri"/>
+              <a:cs typeface="Cordia New"/>
+            </a:endParaRPr>
+          </a:p>
+        </p:txBody>
+      </p:sp>
+      <p:sp>
+        <p:nvSpPr>
+          <p:cNvPr id="6" name="Pentagon 5"/>
+          <p:cNvSpPr/>
+          <p:nvPr/>
+        </p:nvSpPr>
+        <p:spPr>
+          <a:xfrm>
+            <a:off x="1371600" y="1922383"/>
+            <a:ext cx="3510519" cy="2620165"/>
+          </a:xfrm>
+          <a:prstGeom prst="homePlate">
+            <a:avLst/>
+          </a:prstGeom>
+        </p:spPr>
+        <p:style>
+          <a:lnRef idx="2">
+            <a:schemeClr val="accent1"/>
+          </a:lnRef>
+          <a:fillRef idx="1">
+            <a:schemeClr val="lt1"/>
+          </a:fillRef>
+          <a:effectRef idx="0">
+            <a:schemeClr val="accent1"/>
+          </a:effectRef>
+          <a:fontRef idx="minor">
+            <a:schemeClr val="dk1"/>
+          </a:fontRef>
+        </p:style>
+        <p:txBody>
+          <a:bodyPr rot="0" spcFirstLastPara="0" vert="horz" wrap="square" lIns="91440" tIns="45720" rIns="91440" bIns="45720" numCol="1" spcCol="0" rtlCol="0" fromWordArt="0" anchor="ctr" anchorCtr="0" forceAA="0" compatLnSpc="1">
+            <a:prstTxWarp prst="textNoShape">
+              <a:avLst/>
+            </a:prstTxWarp>
+            <a:noAutofit/>
+          </a:bodyPr>
+          <a:lstStyle/>
+          <a:p>
+            <a:r>
+              <a:rPr lang="en-US" sz="3200" dirty="0"/>
+              <a:t>Wait for user tap to continue</a:t>
+            </a:r>
+          </a:p>
+        </p:txBody>
+      </p:sp>
+      <p:sp>
+        <p:nvSpPr>
+          <p:cNvPr id="8" name="Flowchart: Alternate Process 7"/>
+          <p:cNvSpPr/>
+          <p:nvPr/>
+        </p:nvSpPr>
+        <p:spPr>
+          <a:xfrm>
+            <a:off x="1371600" y="1031621"/>
+            <a:ext cx="1173223" cy="644947"/>
+          </a:xfrm>
+          <a:prstGeom prst="flowChartAlternateProcess">
+            <a:avLst/>
+          </a:prstGeom>
+        </p:spPr>
+        <p:style>
+          <a:lnRef idx="2">
+            <a:schemeClr val="accent1">
+              <a:shade val="50000"/>
+            </a:schemeClr>
+          </a:lnRef>
+          <a:fillRef idx="1">
+            <a:schemeClr val="accent1"/>
+          </a:fillRef>
+          <a:effectRef idx="0">
+            <a:schemeClr val="accent1"/>
+          </a:effectRef>
+          <a:fontRef idx="minor">
+            <a:schemeClr val="lt1"/>
+          </a:fontRef>
+        </p:style>
+        <p:txBody>
+          <a:bodyPr rot="0" spcFirstLastPara="0" vert="horz" wrap="square" lIns="91440" tIns="45720" rIns="91440" bIns="45720" numCol="1" spcCol="0" rtlCol="0" fromWordArt="0" anchor="ctr" anchorCtr="0" forceAA="0" compatLnSpc="1">
+            <a:prstTxWarp prst="textNoShape">
+              <a:avLst/>
+            </a:prstTxWarp>
+            <a:noAutofit/>
+          </a:bodyPr>
+          <a:lstStyle/>
+          <a:p>
+            <a:pPr marL="0" marR="0" algn="ctr">
+              <a:lnSpc>
+                <a:spcPct val="115000"/>
+              </a:lnSpc>
+              <a:spcBef>
+                <a:spcPts val="0"/>
+              </a:spcBef>
+              <a:spcAft>
+                <a:spcPts val="1000"/>
+              </a:spcAft>
+            </a:pPr>
+            <a:r>
+              <a:rPr lang="en-US" sz="2800" b="1" dirty="0" smtClean="0">
+                <a:ea typeface="Calibri"/>
+                <a:cs typeface="Cordia New"/>
+              </a:rPr>
+              <a:t>Pause</a:t>
+            </a:r>
+            <a:endParaRPr lang="en-US" sz="2800" dirty="0">
+              <a:effectLst/>
+              <a:ea typeface="Calibri"/>
+              <a:cs typeface="Cordia New"/>
+            </a:endParaRPr>
+          </a:p>
+        </p:txBody>
+      </p:sp>
+    </p:spTree>
+    <p:extLst>
+      <p:ext uri="{BB962C8B-B14F-4D97-AF65-F5344CB8AC3E}">
+        <p14:creationId xmlns:p14="http://schemas.microsoft.com/office/powerpoint/2010/main" val="819896303"/>
+      </p:ext>
+    </p:extLst>
+  </p:cSld>
+  <p:clrMapOvr>
+    <a:masterClrMapping/>
+  </p:clrMapOvr>
+  <p:timing>
+    <p:tnLst>
+      <p:par>
+        <p:cTn id="1" dur="indefinite" restart="never" nodeType="tmRoot">
+          <p:childTnLst>
+            <p:seq concurrent="1" nextAc="seek">
+              <p:cTn id="2" dur="indefinite" nodeType="mainSeq">
+                <p:childTnLst>
+                  <p:par>
+                    <p:cTn id="3" fill="hold">
+                      <p:stCondLst>
+                        <p:cond delay="indefinite"/>
+                      </p:stCondLst>
+                      <p:childTnLst>
+                        <p:par>
+                          <p:cTn id="4" fill="hold">
+                            <p:stCondLst>
+                              <p:cond delay="0"/>
+                            </p:stCondLst>
+                            <p:childTnLst>
+                              <p:par>
+                                <p:cTn id="5" presetID="10" presetClass="entr" presetSubtype="0" fill="hold" grpId="0" nodeType="clickEffect">
+                                  <p:stCondLst>
+                                    <p:cond delay="0"/>
+                                  </p:stCondLst>
+                                  <p:childTnLst>
+                                    <p:set>
+                                      <p:cBhvr>
+                                        <p:cTn id="6" dur="1" fill="hold">
+                                          <p:stCondLst>
+                                            <p:cond delay="0"/>
+                                          </p:stCondLst>
+                                        </p:cTn>
+                                        <p:tgtEl>
+                                          <p:spTgt spid="6"/>
+                                        </p:tgtEl>
+                                        <p:attrNameLst>
+                                          <p:attrName>style.visibility</p:attrName>
+                                        </p:attrNameLst>
+                                      </p:cBhvr>
+                                      <p:to>
+                                        <p:strVal val="visible"/>
+                                      </p:to>
+                                    </p:set>
+                                    <p:animEffect transition="in" filter="fade">
+                                      <p:cBhvr>
+                                        <p:cTn id="7" dur="500"/>
+                                        <p:tgtEl>
+                                          <p:spTgt spid="6"/>
+                                        </p:tgtEl>
+                                      </p:cBhvr>
+                                    </p:animEffect>
+                                  </p:childTnLst>
+                                </p:cTn>
+                              </p:par>
+                              <p:par>
+                                <p:cTn id="8" presetID="10" presetClass="entr" presetSubtype="0" fill="hold" grpId="0" nodeType="withEffect">
+                                  <p:stCondLst>
+                                    <p:cond delay="0"/>
+                                  </p:stCondLst>
+                                  <p:childTnLst>
+                                    <p:set>
+                                      <p:cBhvr>
+                                        <p:cTn id="9" dur="1" fill="hold">
+                                          <p:stCondLst>
+                                            <p:cond delay="0"/>
+                                          </p:stCondLst>
+                                        </p:cTn>
+                                        <p:tgtEl>
+                                          <p:spTgt spid="5"/>
+                                        </p:tgtEl>
+                                        <p:attrNameLst>
+                                          <p:attrName>style.visibility</p:attrName>
+                                        </p:attrNameLst>
+                                      </p:cBhvr>
+                                      <p:to>
+                                        <p:strVal val="visible"/>
+                                      </p:to>
+                                    </p:set>
+                                    <p:animEffect transition="in" filter="fade">
+                                      <p:cBhvr>
+                                        <p:cTn id="10" dur="500"/>
+                                        <p:tgtEl>
+                                          <p:spTgt spid="5"/>
+                                        </p:tgtEl>
+                                      </p:cBhvr>
+                                    </p:animEffect>
+                                  </p:childTnLst>
+                                </p:cTn>
+                              </p:par>
+                              <p:par>
+                                <p:cTn id="11" presetID="10" presetClass="entr" presetSubtype="0" fill="hold" grpId="0" nodeType="withEffect">
+                                  <p:stCondLst>
+                                    <p:cond delay="0"/>
+                                  </p:stCondLst>
+                                  <p:childTnLst>
+                                    <p:set>
+                                      <p:cBhvr>
+                                        <p:cTn id="12" dur="1" fill="hold">
+                                          <p:stCondLst>
+                                            <p:cond delay="0"/>
+                                          </p:stCondLst>
+                                        </p:cTn>
+                                        <p:tgtEl>
+                                          <p:spTgt spid="8"/>
+                                        </p:tgtEl>
+                                        <p:attrNameLst>
+                                          <p:attrName>style.visibility</p:attrName>
+                                        </p:attrNameLst>
+                                      </p:cBhvr>
+                                      <p:to>
+                                        <p:strVal val="visible"/>
+                                      </p:to>
+                                    </p:set>
+                                    <p:animEffect transition="in" filter="fade">
+                                      <p:cBhvr>
+                                        <p:cTn id="13" dur="500"/>
+                                        <p:tgtEl>
+                                          <p:spTgt spid="8"/>
+                                        </p:tgtEl>
+                                      </p:cBhvr>
+                                    </p:animEffect>
+                                  </p:childTnLst>
+                                </p:cTn>
+                              </p:par>
+                            </p:childTnLst>
+                          </p:cTn>
+                        </p:par>
+                      </p:childTnLst>
+                    </p:cTn>
+                  </p:par>
+                </p:childTnLst>
+              </p:cTn>
+              <p:prevCondLst>
+                <p:cond evt="onPrev" delay="0">
+                  <p:tgtEl>
+                    <p:sldTgt/>
+                  </p:tgtEl>
+                </p:cond>
+              </p:prevCondLst>
+              <p:nextCondLst>
+                <p:cond evt="onNext" delay="0">
+                  <p:tgtEl>
+                    <p:sldTgt/>
+                  </p:tgtEl>
+                </p:cond>
+              </p:nextCondLst>
+            </p:seq>
+          </p:childTnLst>
+        </p:cTn>
+      </p:par>
+    </p:tnLst>
+    <p:bldLst>
+      <p:bldP spid="5" grpId="0" animBg="1"/>
       <p:bldP spid="6" grpId="0" animBg="1"/>
       <p:bldP spid="8" grpId="0" animBg="1"/>
     </p:bldLst>

</xml_diff>

<commit_message>
add content in slide @ 11.00PM
</commit_message>
<xml_diff>
--- a/Doc/ProjectPresentation1.pptx
+++ b/Doc/ProjectPresentation1.pptx
@@ -6734,11 +6734,11 @@
   <p:clrMapOvr>
     <a:masterClrMapping/>
   </p:clrMapOvr>
-  <mc:AlternateContent xmlns:mc="http://schemas.openxmlformats.org/markup-compatibility/2006">
-    <mc:Choice xmlns:p14="http://schemas.microsoft.com/office/powerpoint/2010/main" Requires="p14">
+  <mc:AlternateContent xmlns:mc="http://schemas.openxmlformats.org/markup-compatibility/2006" xmlns:p14="http://schemas.microsoft.com/office/powerpoint/2010/main">
+    <mc:Choice Requires="p14">
       <p:transition spd="slow" p14:dur="2000"/>
     </mc:Choice>
-    <mc:Fallback>
+    <mc:Fallback xmlns="">
       <p:transition spd="slow"/>
     </mc:Fallback>
   </mc:AlternateContent>
@@ -11211,8 +11211,17 @@
                 <a:latin typeface="Angsana New" pitchFamily="18" charset="-34"/>
                 <a:cs typeface="Angsana New" pitchFamily="18" charset="-34"/>
               </a:rPr>
-              <a:t>สร้าง</a:t>
+              <a:t>สร้างโปรแกรมประยุกต์</a:t>
             </a:r>
+            <a:r>
+              <a:rPr lang="th-TH" smtClean="0">
+                <a:latin typeface="Angsana New" pitchFamily="18" charset="-34"/>
+                <a:cs typeface="Angsana New" pitchFamily="18" charset="-34"/>
+              </a:rPr>
+              <a:t>ที่แตกต่างออกสู่ตลาดโลก</a:t>
+            </a:r>
+          </a:p>
+          <a:p>
             <a:endParaRPr lang="en-US" dirty="0">
               <a:latin typeface="Angsana New" pitchFamily="18" charset="-34"/>
               <a:cs typeface="Angsana New" pitchFamily="18" charset="-34"/>
@@ -11402,21 +11411,7 @@
                 <a:latin typeface="Angsana New" pitchFamily="18" charset="-34"/>
                 <a:cs typeface="Angsana New" pitchFamily="18" charset="-34"/>
               </a:rPr>
-              <a:t>เป็นกระแสที่มาแรงขึ้น</a:t>
-            </a:r>
-            <a:r>
-              <a:rPr lang="th-TH" dirty="0" smtClean="0">
-                <a:latin typeface="Angsana New" pitchFamily="18" charset="-34"/>
-                <a:cs typeface="Angsana New" pitchFamily="18" charset="-34"/>
-              </a:rPr>
-              <a:t>เรื่อยๆ </a:t>
-            </a:r>
-            <a:r>
-              <a:rPr lang="th-TH" dirty="0" smtClean="0">
-                <a:latin typeface="Angsana New" pitchFamily="18" charset="-34"/>
-                <a:cs typeface="Angsana New" pitchFamily="18" charset="-34"/>
-              </a:rPr>
-              <a:t>จึงเป็นที่น่าสนใจ</a:t>
+              <a:t>เป็นกระแสที่มาแรงขึ้นเรื่อยๆ จึงเป็นที่น่าสนใจ</a:t>
             </a:r>
           </a:p>
           <a:p>
@@ -11649,11 +11644,11 @@
   <p:clrMapOvr>
     <a:masterClrMapping/>
   </p:clrMapOvr>
-  <mc:AlternateContent xmlns:mc="http://schemas.openxmlformats.org/markup-compatibility/2006">
-    <mc:Choice xmlns:p14="http://schemas.microsoft.com/office/powerpoint/2010/main" Requires="p14">
+  <mc:AlternateContent xmlns:mc="http://schemas.openxmlformats.org/markup-compatibility/2006" xmlns:p14="http://schemas.microsoft.com/office/powerpoint/2010/main">
+    <mc:Choice Requires="p14">
       <p:transition spd="slow" p14:dur="2000"/>
     </mc:Choice>
-    <mc:Fallback>
+    <mc:Fallback xmlns="">
       <p:transition spd="slow"/>
     </mc:Fallback>
   </mc:AlternateContent>
@@ -11835,7 +11830,7 @@
             <p:ph idx="1"/>
             <p:extLst>
               <p:ext uri="{D42A27DB-BD31-4B8C-83A1-F6EECF244321}">
-                <p14:modId xmlns:p14="http://schemas.microsoft.com/office/powerpoint/2010/main" val="3740753175"/>
+                <p14:modId xmlns:p14="http://schemas.microsoft.com/office/powerpoint/2010/main" val="3948974983"/>
               </p:ext>
             </p:extLst>
           </p:nvPr>
@@ -12314,6 +12309,13 @@
                     <a:lstStyle/>
                     <a:p>
                       <a:pPr algn="ctr"/>
+                      <a:r>
+                        <a:rPr lang="th-TH" sz="2400" dirty="0" smtClean="0">
+                          <a:latin typeface="Angsana New" pitchFamily="18" charset="-34"/>
+                          <a:cs typeface="Angsana New" pitchFamily="18" charset="-34"/>
+                        </a:rPr>
+                        <a:t>ความแพร่หลาย</a:t>
+                      </a:r>
                       <a:endParaRPr lang="en-US" sz="2400" dirty="0">
                         <a:latin typeface="Angsana New" pitchFamily="18" charset="-34"/>
                         <a:cs typeface="Angsana New" pitchFamily="18" charset="-34"/>
@@ -12328,6 +12330,13 @@
                     <a:lstStyle/>
                     <a:p>
                       <a:pPr algn="ctr"/>
+                      <a:r>
+                        <a:rPr lang="th-TH" sz="2400" dirty="0" smtClean="0">
+                          <a:latin typeface="Angsana New" pitchFamily="18" charset="-34"/>
+                          <a:cs typeface="Angsana New" pitchFamily="18" charset="-34"/>
+                        </a:rPr>
+                        <a:t>มาก</a:t>
+                      </a:r>
                       <a:endParaRPr lang="en-US" sz="2400" dirty="0">
                         <a:latin typeface="Angsana New" pitchFamily="18" charset="-34"/>
                         <a:cs typeface="Angsana New" pitchFamily="18" charset="-34"/>
@@ -12342,6 +12351,13 @@
                     <a:lstStyle/>
                     <a:p>
                       <a:pPr algn="ctr"/>
+                      <a:r>
+                        <a:rPr lang="th-TH" sz="2400" dirty="0" smtClean="0">
+                          <a:latin typeface="Angsana New" pitchFamily="18" charset="-34"/>
+                          <a:cs typeface="Angsana New" pitchFamily="18" charset="-34"/>
+                        </a:rPr>
+                        <a:t>มาก</a:t>
+                      </a:r>
                       <a:endParaRPr lang="en-US" sz="2400" dirty="0">
                         <a:latin typeface="Angsana New" pitchFamily="18" charset="-34"/>
                         <a:cs typeface="Angsana New" pitchFamily="18" charset="-34"/>
@@ -12356,6 +12372,13 @@
                     <a:lstStyle/>
                     <a:p>
                       <a:pPr algn="ctr"/>
+                      <a:r>
+                        <a:rPr lang="th-TH" sz="2400" dirty="0" smtClean="0">
+                          <a:latin typeface="Angsana New" pitchFamily="18" charset="-34"/>
+                          <a:cs typeface="Angsana New" pitchFamily="18" charset="-34"/>
+                        </a:rPr>
+                        <a:t>น้อย</a:t>
+                      </a:r>
                       <a:endParaRPr lang="en-US" sz="2400" dirty="0">
                         <a:latin typeface="Angsana New" pitchFamily="18" charset="-34"/>
                         <a:cs typeface="Angsana New" pitchFamily="18" charset="-34"/>
@@ -12445,72 +12468,53 @@
           <a:lstStyle/>
           <a:p>
             <a:r>
-              <a:rPr lang="th-TH" dirty="0">
+              <a:rPr lang="th-TH" dirty="0" smtClean="0">
                 <a:latin typeface="Angsana New" pitchFamily="18" charset="-34"/>
                 <a:cs typeface="Angsana New" pitchFamily="18" charset="-34"/>
               </a:rPr>
-              <a:t>เพื่อการศึกษาการเขียนโปรแกรมใช้ในระบบปฏิบัติการแอนดรอยด์</a:t>
+              <a:t>เพื่อสร้างโปรแกรม</a:t>
             </a:r>
-            <a:endParaRPr lang="en-US" dirty="0">
-              <a:latin typeface="Angsana New" pitchFamily="18" charset="-34"/>
-              <a:cs typeface="Angsana New" pitchFamily="18" charset="-34"/>
-            </a:endParaRPr>
-          </a:p>
-          <a:p>
-            <a:r>
-              <a:rPr lang="th-TH" dirty="0">
-                <a:latin typeface="Angsana New" pitchFamily="18" charset="-34"/>
-                <a:cs typeface="Angsana New" pitchFamily="18" charset="-34"/>
-              </a:rPr>
-              <a:t>เพื่อศึกษาเกี่ยวกับการใช้  </a:t>
-            </a:r>
-            <a:r>
-              <a:rPr lang="en-US" dirty="0">
-                <a:latin typeface="Angsana New" pitchFamily="18" charset="-34"/>
-                <a:cs typeface="Angsana New" pitchFamily="18" charset="-34"/>
-              </a:rPr>
-              <a:t>Global Positioning </a:t>
-            </a:r>
-            <a:r>
-              <a:rPr lang="en-US" dirty="0" smtClean="0">
-                <a:latin typeface="Angsana New" pitchFamily="18" charset="-34"/>
-                <a:cs typeface="Angsana New" pitchFamily="18" charset="-34"/>
-              </a:rPr>
-              <a:t>System</a:t>
-            </a:r>
-            <a:endParaRPr lang="th-TH" dirty="0" smtClean="0">
-              <a:latin typeface="Angsana New" pitchFamily="18" charset="-34"/>
-              <a:cs typeface="Angsana New" pitchFamily="18" charset="-34"/>
-            </a:endParaRPr>
-          </a:p>
-          <a:p>
             <a:r>
               <a:rPr lang="th-TH" dirty="0" smtClean="0">
                 <a:latin typeface="Angsana New" pitchFamily="18" charset="-34"/>
                 <a:cs typeface="Angsana New" pitchFamily="18" charset="-34"/>
               </a:rPr>
-              <a:t>เพื่อ</a:t>
+              <a:t>ประยุกต์</a:t>
+            </a:r>
+            <a:r>
+              <a:rPr lang="th-TH" dirty="0" smtClean="0">
+                <a:latin typeface="Angsana New" pitchFamily="18" charset="-34"/>
+                <a:cs typeface="Angsana New" pitchFamily="18" charset="-34"/>
+              </a:rPr>
+              <a:t>ใช้</a:t>
             </a:r>
             <a:r>
               <a:rPr lang="th-TH" dirty="0">
                 <a:latin typeface="Angsana New" pitchFamily="18" charset="-34"/>
                 <a:cs typeface="Angsana New" pitchFamily="18" charset="-34"/>
               </a:rPr>
-              <a:t>ศึกษาการใช้ </a:t>
+              <a:t>ในระบบปฏิบัติการแอนดรอยด์</a:t>
             </a:r>
+            <a:endParaRPr lang="en-US" dirty="0">
+              <a:latin typeface="Angsana New" pitchFamily="18" charset="-34"/>
+              <a:cs typeface="Angsana New" pitchFamily="18" charset="-34"/>
+            </a:endParaRPr>
+          </a:p>
+          <a:p>
+            <a:endParaRPr lang="th-TH" dirty="0" smtClean="0"/>
+          </a:p>
+          <a:p>
             <a:r>
-              <a:rPr lang="en-US" dirty="0">
+              <a:rPr lang="th-TH" dirty="0" smtClean="0">
                 <a:latin typeface="Angsana New" pitchFamily="18" charset="-34"/>
                 <a:cs typeface="Angsana New" pitchFamily="18" charset="-34"/>
               </a:rPr>
-              <a:t>Google Map</a:t>
+              <a:t>เพื่อนำความรู้ที่เรียนมาใช้ให้เกิดประโยชน์สูงสุด</a:t>
             </a:r>
-          </a:p>
-          <a:p>
-            <a:endParaRPr lang="th-TH" dirty="0" smtClean="0"/>
-          </a:p>
-          <a:p>
-            <a:endParaRPr lang="en-US" dirty="0"/>
+            <a:endParaRPr lang="en-US" dirty="0">
+              <a:latin typeface="Angsana New" pitchFamily="18" charset="-34"/>
+              <a:cs typeface="Angsana New" pitchFamily="18" charset="-34"/>
+            </a:endParaRPr>
           </a:p>
         </p:txBody>
       </p:sp>

</xml_diff>